<commit_message>
Minor tweaks to positionsLab gif
</commit_message>
<xml_diff>
--- a/doc/PositionsLab gif.pptx
+++ b/doc/PositionsLab gif.pptx
@@ -10,7 +10,7 @@
     <p:sldId id="375" r:id="rId4"/>
     <p:sldId id="366" r:id="rId5"/>
     <p:sldId id="376" r:id="rId6"/>
-    <p:sldId id="377" r:id="rId7"/>
+    <p:sldId id="397" r:id="rId7"/>
     <p:sldId id="365" r:id="rId8"/>
     <p:sldId id="378" r:id="rId9"/>
     <p:sldId id="379" r:id="rId10"/>
@@ -322,7 +322,7 @@
                 </a:solidFill>
               </a:rPr>
               <a:pPr/>
-              <a:t>4/25/2016</a:t>
+              <a:t>4/26/2016</a:t>
             </a:fld>
             <a:endParaRPr lang="en-US">
               <a:solidFill>
@@ -524,7 +524,7 @@
                 </a:solidFill>
               </a:rPr>
               <a:pPr/>
-              <a:t>4/25/2016</a:t>
+              <a:t>4/26/2016</a:t>
             </a:fld>
             <a:endParaRPr lang="en-US">
               <a:solidFill>
@@ -736,7 +736,7 @@
                 </a:solidFill>
               </a:rPr>
               <a:pPr/>
-              <a:t>4/25/2016</a:t>
+              <a:t>4/26/2016</a:t>
             </a:fld>
             <a:endParaRPr lang="en-US">
               <a:solidFill>
@@ -938,7 +938,7 @@
                 </a:solidFill>
               </a:rPr>
               <a:pPr/>
-              <a:t>4/25/2016</a:t>
+              <a:t>4/26/2016</a:t>
             </a:fld>
             <a:endParaRPr lang="en-US">
               <a:solidFill>
@@ -1140,7 +1140,7 @@
                 </a:solidFill>
               </a:rPr>
               <a:pPr/>
-              <a:t>4/25/2016</a:t>
+              <a:t>4/26/2016</a:t>
             </a:fld>
             <a:endParaRPr lang="en-US">
               <a:solidFill>
@@ -1425,7 +1425,7 @@
                 </a:solidFill>
               </a:rPr>
               <a:pPr/>
-              <a:t>4/25/2016</a:t>
+              <a:t>4/26/2016</a:t>
             </a:fld>
             <a:endParaRPr lang="en-US">
               <a:solidFill>
@@ -1745,7 +1745,7 @@
                 </a:solidFill>
               </a:rPr>
               <a:pPr/>
-              <a:t>4/25/2016</a:t>
+              <a:t>4/26/2016</a:t>
             </a:fld>
             <a:endParaRPr lang="en-US">
               <a:solidFill>
@@ -2204,7 +2204,7 @@
                 </a:solidFill>
               </a:rPr>
               <a:pPr/>
-              <a:t>4/25/2016</a:t>
+              <a:t>4/26/2016</a:t>
             </a:fld>
             <a:endParaRPr lang="en-US">
               <a:solidFill>
@@ -2354,7 +2354,7 @@
                 </a:solidFill>
               </a:rPr>
               <a:pPr/>
-              <a:t>4/25/2016</a:t>
+              <a:t>4/26/2016</a:t>
             </a:fld>
             <a:endParaRPr lang="en-US">
               <a:solidFill>
@@ -2481,7 +2481,7 @@
                 </a:solidFill>
               </a:rPr>
               <a:pPr/>
-              <a:t>4/25/2016</a:t>
+              <a:t>4/26/2016</a:t>
             </a:fld>
             <a:endParaRPr lang="en-US">
               <a:solidFill>
@@ -2790,7 +2790,7 @@
                 </a:solidFill>
               </a:rPr>
               <a:pPr/>
-              <a:t>4/25/2016</a:t>
+              <a:t>4/26/2016</a:t>
             </a:fld>
             <a:endParaRPr lang="en-US">
               <a:solidFill>
@@ -3075,7 +3075,7 @@
                 </a:solidFill>
               </a:rPr>
               <a:pPr/>
-              <a:t>4/25/2016</a:t>
+              <a:t>4/26/2016</a:t>
             </a:fld>
             <a:endParaRPr lang="en-US">
               <a:solidFill>
@@ -3323,7 +3323,7 @@
                 </a:solidFill>
               </a:rPr>
               <a:pPr/>
-              <a:t>4/25/2016</a:t>
+              <a:t>4/26/2016</a:t>
             </a:fld>
             <a:endParaRPr lang="en-US">
               <a:solidFill>
@@ -4339,7 +4339,7 @@
   </p:clrMapOvr>
   <mc:AlternateContent xmlns:mc="http://schemas.openxmlformats.org/markup-compatibility/2006">
     <mc:Choice xmlns:p14="http://schemas.microsoft.com/office/powerpoint/2010/main" Requires="p14">
-      <p:transition p14:dur="0" advTm="1000"/>
+      <p:transition p14:dur="10" advTm="1000"/>
     </mc:Choice>
     <mc:Fallback>
       <p:transition advTm="1000"/>
@@ -4646,13 +4646,13 @@
   <p:clrMapOvr>
     <a:masterClrMapping/>
   </p:clrMapOvr>
-  <mc:AlternateContent xmlns:mc="http://schemas.openxmlformats.org/markup-compatibility/2006">
-    <mc:Choice xmlns:p14="http://schemas.microsoft.com/office/powerpoint/2010/main" Requires="p14">
+  <mc:AlternateContent xmlns:mc="http://schemas.openxmlformats.org/markup-compatibility/2006" xmlns:p14="http://schemas.microsoft.com/office/powerpoint/2010/main">
+    <mc:Choice Requires="p14">
       <p:transition spd="med" p14:dur="700" advTm="1000">
         <p:fade/>
       </p:transition>
     </mc:Choice>
-    <mc:Fallback>
+    <mc:Fallback xmlns="">
       <p:transition spd="med" advTm="1000">
         <p:fade/>
       </p:transition>
@@ -5572,11 +5572,11 @@
   <p:clrMapOvr>
     <a:masterClrMapping/>
   </p:clrMapOvr>
-  <mc:AlternateContent xmlns:mc="http://schemas.openxmlformats.org/markup-compatibility/2006">
-    <mc:Choice xmlns:p14="http://schemas.microsoft.com/office/powerpoint/2010/main" Requires="p14">
+  <mc:AlternateContent xmlns:mc="http://schemas.openxmlformats.org/markup-compatibility/2006" xmlns:p14="http://schemas.microsoft.com/office/powerpoint/2010/main">
+    <mc:Choice Requires="p14">
       <p:transition p14:dur="250" advTm="0"/>
     </mc:Choice>
-    <mc:Fallback>
+    <mc:Fallback xmlns="">
       <p:transition advTm="0"/>
     </mc:Fallback>
   </mc:AlternateContent>
@@ -5937,11 +5937,11 @@
   <p:clrMapOvr>
     <a:masterClrMapping/>
   </p:clrMapOvr>
-  <mc:AlternateContent xmlns:mc="http://schemas.openxmlformats.org/markup-compatibility/2006">
-    <mc:Choice xmlns:p14="http://schemas.microsoft.com/office/powerpoint/2010/main" Requires="p14">
+  <mc:AlternateContent xmlns:mc="http://schemas.openxmlformats.org/markup-compatibility/2006" xmlns:p14="http://schemas.microsoft.com/office/powerpoint/2010/main">
+    <mc:Choice Requires="p14">
       <p:transition p14:dur="250" advTm="0"/>
     </mc:Choice>
-    <mc:Fallback>
+    <mc:Fallback xmlns="">
       <p:transition advTm="0"/>
     </mc:Fallback>
   </mc:AlternateContent>
@@ -6302,11 +6302,11 @@
   <p:clrMapOvr>
     <a:masterClrMapping/>
   </p:clrMapOvr>
-  <mc:AlternateContent xmlns:mc="http://schemas.openxmlformats.org/markup-compatibility/2006">
-    <mc:Choice xmlns:p14="http://schemas.microsoft.com/office/powerpoint/2010/main" Requires="p14">
+  <mc:AlternateContent xmlns:mc="http://schemas.openxmlformats.org/markup-compatibility/2006" xmlns:p14="http://schemas.microsoft.com/office/powerpoint/2010/main">
+    <mc:Choice Requires="p14">
       <p:transition p14:dur="250" advTm="0"/>
     </mc:Choice>
-    <mc:Fallback>
+    <mc:Fallback xmlns="">
       <p:transition advTm="0"/>
     </mc:Fallback>
   </mc:AlternateContent>
@@ -6667,11 +6667,11 @@
   <p:clrMapOvr>
     <a:masterClrMapping/>
   </p:clrMapOvr>
-  <mc:AlternateContent xmlns:mc="http://schemas.openxmlformats.org/markup-compatibility/2006">
-    <mc:Choice xmlns:p14="http://schemas.microsoft.com/office/powerpoint/2010/main" Requires="p14">
+  <mc:AlternateContent xmlns:mc="http://schemas.openxmlformats.org/markup-compatibility/2006" xmlns:p14="http://schemas.microsoft.com/office/powerpoint/2010/main">
+    <mc:Choice Requires="p14">
       <p:transition p14:dur="250" advTm="0"/>
     </mc:Choice>
-    <mc:Fallback>
+    <mc:Fallback xmlns="">
       <p:transition advTm="0"/>
     </mc:Fallback>
   </mc:AlternateContent>
@@ -7032,11 +7032,11 @@
   <p:clrMapOvr>
     <a:masterClrMapping/>
   </p:clrMapOvr>
-  <mc:AlternateContent xmlns:mc="http://schemas.openxmlformats.org/markup-compatibility/2006">
-    <mc:Choice xmlns:p14="http://schemas.microsoft.com/office/powerpoint/2010/main" Requires="p14">
+  <mc:AlternateContent xmlns:mc="http://schemas.openxmlformats.org/markup-compatibility/2006" xmlns:p14="http://schemas.microsoft.com/office/powerpoint/2010/main">
+    <mc:Choice Requires="p14">
       <p:transition p14:dur="250" advTm="1000"/>
     </mc:Choice>
-    <mc:Fallback>
+    <mc:Fallback xmlns="">
       <p:transition advTm="1000"/>
     </mc:Fallback>
   </mc:AlternateContent>
@@ -7119,8 +7119,8 @@
         </p:nvSpPr>
         <p:spPr>
           <a:xfrm rot="8553647">
-            <a:off x="3195650" y="2622616"/>
-            <a:ext cx="602433" cy="617423"/>
+            <a:off x="3157160" y="2509033"/>
+            <a:ext cx="976107" cy="617423"/>
           </a:xfrm>
           <a:prstGeom prst="homePlate">
             <a:avLst/>
@@ -7172,8 +7172,8 @@
         </p:nvSpPr>
         <p:spPr>
           <a:xfrm rot="10457336">
-            <a:off x="3591461" y="3626331"/>
-            <a:ext cx="596347" cy="617423"/>
+            <a:off x="3565987" y="3609888"/>
+            <a:ext cx="976107" cy="617423"/>
           </a:xfrm>
           <a:prstGeom prst="homePlate">
             <a:avLst/>
@@ -7225,8 +7225,8 @@
         </p:nvSpPr>
         <p:spPr>
           <a:xfrm rot="12393814">
-            <a:off x="3391503" y="4695548"/>
-            <a:ext cx="570046" cy="617423"/>
+            <a:off x="3370071" y="4786338"/>
+            <a:ext cx="976107" cy="617423"/>
           </a:xfrm>
           <a:prstGeom prst="homePlate">
             <a:avLst/>
@@ -7278,8 +7278,8 @@
         </p:nvSpPr>
         <p:spPr>
           <a:xfrm rot="14263705">
-            <a:off x="2672735" y="5496350"/>
-            <a:ext cx="628669" cy="617423"/>
+            <a:off x="2591771" y="5643232"/>
+            <a:ext cx="976107" cy="617423"/>
           </a:xfrm>
           <a:prstGeom prst="homePlate">
             <a:avLst/>
@@ -7385,13 +7385,13 @@
   <p:clrMapOvr>
     <a:masterClrMapping/>
   </p:clrMapOvr>
-  <mc:AlternateContent xmlns:mc="http://schemas.openxmlformats.org/markup-compatibility/2006">
-    <mc:Choice xmlns:p14="http://schemas.microsoft.com/office/powerpoint/2010/main" Requires="p14">
+  <mc:AlternateContent xmlns:mc="http://schemas.openxmlformats.org/markup-compatibility/2006" xmlns:p14="http://schemas.microsoft.com/office/powerpoint/2010/main">
+    <mc:Choice Requires="p14">
       <p:transition spd="med" p14:dur="700" advTm="1000">
         <p:fade/>
       </p:transition>
     </mc:Choice>
-    <mc:Fallback>
+    <mc:Fallback xmlns="">
       <p:transition spd="med" advTm="1000">
         <p:fade/>
       </p:transition>
@@ -7711,8 +7711,8 @@
         </p:nvSpPr>
         <p:spPr>
           <a:xfrm rot="35553633">
-            <a:off x="3195650" y="2622616"/>
-            <a:ext cx="602433" cy="617423"/>
+            <a:off x="3019580" y="2639250"/>
+            <a:ext cx="980049" cy="617423"/>
           </a:xfrm>
           <a:prstGeom prst="homePlate">
             <a:avLst/>
@@ -7764,8 +7764,8 @@
         </p:nvSpPr>
         <p:spPr>
           <a:xfrm rot="37457325">
-            <a:off x="3591461" y="3626331"/>
-            <a:ext cx="596347" cy="617423"/>
+            <a:off x="3399610" y="3626331"/>
+            <a:ext cx="980049" cy="617423"/>
           </a:xfrm>
           <a:prstGeom prst="homePlate">
             <a:avLst/>
@@ -7817,8 +7817,8 @@
         </p:nvSpPr>
         <p:spPr>
           <a:xfrm rot="39393809">
-            <a:off x="3391503" y="4695548"/>
-            <a:ext cx="570046" cy="617423"/>
+            <a:off x="3186501" y="4695548"/>
+            <a:ext cx="980049" cy="617423"/>
           </a:xfrm>
           <a:prstGeom prst="homePlate">
             <a:avLst/>
@@ -7870,8 +7870,8 @@
         </p:nvSpPr>
         <p:spPr>
           <a:xfrm rot="41263704">
-            <a:off x="2672735" y="5496350"/>
-            <a:ext cx="628669" cy="617423"/>
+            <a:off x="2497045" y="5496350"/>
+            <a:ext cx="980049" cy="617423"/>
           </a:xfrm>
           <a:prstGeom prst="homePlate">
             <a:avLst/>
@@ -7977,13 +7977,13 @@
   <p:clrMapOvr>
     <a:masterClrMapping/>
   </p:clrMapOvr>
-  <mc:AlternateContent xmlns:mc="http://schemas.openxmlformats.org/markup-compatibility/2006">
-    <mc:Choice xmlns:p14="http://schemas.microsoft.com/office/powerpoint/2010/main" Requires="p14">
+  <mc:AlternateContent xmlns:mc="http://schemas.openxmlformats.org/markup-compatibility/2006" xmlns:p14="http://schemas.microsoft.com/office/powerpoint/2010/main">
+    <mc:Choice Requires="p14">
       <p:transition spd="med" p14:dur="700" advTm="1000">
         <p:fade/>
       </p:transition>
     </mc:Choice>
-    <mc:Fallback>
+    <mc:Fallback xmlns="">
       <p:transition spd="med" advTm="1000">
         <p:fade/>
       </p:transition>
@@ -8068,8 +8068,8 @@
         </p:nvSpPr>
         <p:spPr>
           <a:xfrm rot="19353635">
-            <a:off x="3195650" y="2622616"/>
-            <a:ext cx="602433" cy="617423"/>
+            <a:off x="3167425" y="2539323"/>
+            <a:ext cx="876458" cy="617423"/>
           </a:xfrm>
           <a:prstGeom prst="homePlate">
             <a:avLst/>
@@ -8121,8 +8121,8 @@
         </p:nvSpPr>
         <p:spPr>
           <a:xfrm rot="21257325">
-            <a:off x="3591461" y="3626331"/>
-            <a:ext cx="596347" cy="617423"/>
+            <a:off x="3590766" y="3612393"/>
+            <a:ext cx="876458" cy="617423"/>
           </a:xfrm>
           <a:prstGeom prst="homePlate">
             <a:avLst/>
@@ -8174,8 +8174,8 @@
         </p:nvSpPr>
         <p:spPr>
           <a:xfrm rot="23193809">
-            <a:off x="3391503" y="4695548"/>
-            <a:ext cx="570046" cy="617423"/>
+            <a:off x="3375330" y="4764060"/>
+            <a:ext cx="876458" cy="617423"/>
           </a:xfrm>
           <a:prstGeom prst="homePlate">
             <a:avLst/>
@@ -8227,8 +8227,8 @@
         </p:nvSpPr>
         <p:spPr>
           <a:xfrm rot="25063704">
-            <a:off x="2672735" y="5496350"/>
-            <a:ext cx="628669" cy="617423"/>
+            <a:off x="2614992" y="5601106"/>
+            <a:ext cx="876458" cy="617423"/>
           </a:xfrm>
           <a:prstGeom prst="homePlate">
             <a:avLst/>
@@ -8334,13 +8334,13 @@
   <p:clrMapOvr>
     <a:masterClrMapping/>
   </p:clrMapOvr>
-  <mc:AlternateContent xmlns:mc="http://schemas.openxmlformats.org/markup-compatibility/2006">
-    <mc:Choice xmlns:p14="http://schemas.microsoft.com/office/powerpoint/2010/main" Requires="p14">
+  <mc:AlternateContent xmlns:mc="http://schemas.openxmlformats.org/markup-compatibility/2006" xmlns:p14="http://schemas.microsoft.com/office/powerpoint/2010/main">
+    <mc:Choice Requires="p14">
       <p:transition spd="med" p14:dur="700" advTm="1000">
         <p:fade/>
       </p:transition>
     </mc:Choice>
-    <mc:Fallback>
+    <mc:Fallback xmlns="">
       <p:transition spd="med" advTm="1000">
         <p:fade/>
       </p:transition>
@@ -8669,13 +8669,13 @@
   <p:clrMapOvr>
     <a:masterClrMapping/>
   </p:clrMapOvr>
-  <mc:AlternateContent xmlns:mc="http://schemas.openxmlformats.org/markup-compatibility/2006">
-    <mc:Choice xmlns:p14="http://schemas.microsoft.com/office/powerpoint/2010/main" Requires="p14">
+  <mc:AlternateContent xmlns:mc="http://schemas.openxmlformats.org/markup-compatibility/2006" xmlns:p14="http://schemas.microsoft.com/office/powerpoint/2010/main">
+    <mc:Choice Requires="p14">
       <p:transition spd="med" p14:dur="700" advTm="2000">
         <p:fade/>
       </p:transition>
     </mc:Choice>
-    <mc:Fallback>
+    <mc:Fallback xmlns="">
       <p:transition spd="med" advTm="2000">
         <p:fade/>
       </p:transition>
@@ -9132,11 +9132,11 @@
   <p:clrMapOvr>
     <a:masterClrMapping/>
   </p:clrMapOvr>
-  <mc:AlternateContent xmlns:mc="http://schemas.openxmlformats.org/markup-compatibility/2006">
-    <mc:Choice xmlns:p14="http://schemas.microsoft.com/office/powerpoint/2010/main" Requires="p14">
+  <mc:AlternateContent xmlns:mc="http://schemas.openxmlformats.org/markup-compatibility/2006" xmlns:p14="http://schemas.microsoft.com/office/powerpoint/2010/main">
+    <mc:Choice Requires="p14">
       <p:transition spd="med" p14:dur="700" advClick="0" advTm="0"/>
     </mc:Choice>
-    <mc:Fallback>
+    <mc:Fallback xmlns="">
       <p:transition spd="med" advClick="0" advTm="0"/>
     </mc:Fallback>
   </mc:AlternateContent>
@@ -10066,12 +10066,12 @@
   </p:clrMapOvr>
   <mc:AlternateContent xmlns:mc="http://schemas.openxmlformats.org/markup-compatibility/2006">
     <mc:Choice xmlns:p14="http://schemas.microsoft.com/office/powerpoint/2010/main" Requires="p14">
-      <p:transition spd="med" p14:dur="700" advTm="3000">
+      <p:transition spd="med" p14:dur="700" advTm="1000">
         <p:fade/>
       </p:transition>
     </mc:Choice>
     <mc:Fallback>
-      <p:transition spd="med" advTm="3000">
+      <p:transition spd="med" advTm="1000">
         <p:fade/>
       </p:transition>
     </mc:Fallback>
@@ -11321,11 +11321,11 @@
   <p:clrMapOvr>
     <a:masterClrMapping/>
   </p:clrMapOvr>
-  <mc:AlternateContent xmlns:mc="http://schemas.openxmlformats.org/markup-compatibility/2006">
-    <mc:Choice xmlns:p14="http://schemas.microsoft.com/office/powerpoint/2010/main" Requires="p14">
+  <mc:AlternateContent xmlns:mc="http://schemas.openxmlformats.org/markup-compatibility/2006" xmlns:p14="http://schemas.microsoft.com/office/powerpoint/2010/main">
+    <mc:Choice Requires="p14">
       <p:transition spd="med" p14:dur="700" advClick="0" advTm="0"/>
     </mc:Choice>
-    <mc:Fallback>
+    <mc:Fallback xmlns="">
       <p:transition spd="med" advClick="0" advTm="0"/>
     </mc:Fallback>
   </mc:AlternateContent>
@@ -12368,12 +12368,12 @@
   </p:clrMapOvr>
   <mc:AlternateContent xmlns:mc="http://schemas.openxmlformats.org/markup-compatibility/2006">
     <mc:Choice xmlns:p14="http://schemas.microsoft.com/office/powerpoint/2010/main" Requires="p14">
-      <p:transition spd="med" p14:dur="700" advTm="1000">
+      <p:transition spd="med" p14:dur="700" advTm="0">
         <p:fade/>
       </p:transition>
     </mc:Choice>
     <mc:Fallback>
-      <p:transition spd="med" advTm="1000">
+      <p:transition spd="med" advTm="0">
         <p:fade/>
       </p:transition>
     </mc:Fallback>
@@ -12904,13 +12904,13 @@
   <p:clrMapOvr>
     <a:masterClrMapping/>
   </p:clrMapOvr>
-  <mc:AlternateContent xmlns:mc="http://schemas.openxmlformats.org/markup-compatibility/2006">
-    <mc:Choice xmlns:p14="http://schemas.microsoft.com/office/powerpoint/2010/main" Requires="p14">
+  <mc:AlternateContent xmlns:mc="http://schemas.openxmlformats.org/markup-compatibility/2006" xmlns:p14="http://schemas.microsoft.com/office/powerpoint/2010/main">
+    <mc:Choice Requires="p14">
       <p:transition spd="med" p14:dur="700" advTm="0">
         <p:fade/>
       </p:transition>
     </mc:Choice>
-    <mc:Fallback>
+    <mc:Fallback xmlns="">
       <p:transition spd="med" advTm="0">
         <p:fade/>
       </p:transition>
@@ -13475,11 +13475,11 @@
   <p:clrMapOvr>
     <a:masterClrMapping/>
   </p:clrMapOvr>
-  <mc:AlternateContent xmlns:mc="http://schemas.openxmlformats.org/markup-compatibility/2006">
-    <mc:Choice xmlns:p14="http://schemas.microsoft.com/office/powerpoint/2010/main" Requires="p14">
+  <mc:AlternateContent xmlns:mc="http://schemas.openxmlformats.org/markup-compatibility/2006" xmlns:p14="http://schemas.microsoft.com/office/powerpoint/2010/main">
+    <mc:Choice Requires="p14">
       <p:transition spd="med" p14:dur="700" advClick="0" advTm="0"/>
     </mc:Choice>
-    <mc:Fallback>
+    <mc:Fallback xmlns="">
       <p:transition spd="med" advClick="0" advTm="0"/>
     </mc:Fallback>
   </mc:AlternateContent>
@@ -14371,13 +14371,13 @@
   <p:clrMapOvr>
     <a:masterClrMapping/>
   </p:clrMapOvr>
-  <mc:AlternateContent xmlns:mc="http://schemas.openxmlformats.org/markup-compatibility/2006">
-    <mc:Choice xmlns:p14="http://schemas.microsoft.com/office/powerpoint/2010/main" Requires="p14">
+  <mc:AlternateContent xmlns:mc="http://schemas.openxmlformats.org/markup-compatibility/2006" xmlns:p14="http://schemas.microsoft.com/office/powerpoint/2010/main">
+    <mc:Choice Requires="p14">
       <p:transition spd="med" p14:dur="700" advTm="0">
         <p:fade/>
       </p:transition>
     </mc:Choice>
-    <mc:Fallback>
+    <mc:Fallback xmlns="">
       <p:transition spd="med" advTm="0">
         <p:fade/>
       </p:transition>
@@ -14811,11 +14811,11 @@
   <p:clrMapOvr>
     <a:masterClrMapping/>
   </p:clrMapOvr>
-  <mc:AlternateContent xmlns:mc="http://schemas.openxmlformats.org/markup-compatibility/2006">
-    <mc:Choice xmlns:p14="http://schemas.microsoft.com/office/powerpoint/2010/main" Requires="p14">
+  <mc:AlternateContent xmlns:mc="http://schemas.openxmlformats.org/markup-compatibility/2006" xmlns:p14="http://schemas.microsoft.com/office/powerpoint/2010/main">
+    <mc:Choice Requires="p14">
       <p:transition spd="med" p14:dur="700" advClick="0" advTm="0"/>
     </mc:Choice>
-    <mc:Fallback>
+    <mc:Fallback xmlns="">
       <p:transition spd="med" advClick="0" advTm="0"/>
     </mc:Fallback>
   </mc:AlternateContent>
@@ -15308,13 +15308,13 @@
   <p:clrMapOvr>
     <a:masterClrMapping/>
   </p:clrMapOvr>
-  <mc:AlternateContent xmlns:mc="http://schemas.openxmlformats.org/markup-compatibility/2006">
-    <mc:Choice xmlns:p14="http://schemas.microsoft.com/office/powerpoint/2010/main" Requires="p14">
+  <mc:AlternateContent xmlns:mc="http://schemas.openxmlformats.org/markup-compatibility/2006" xmlns:p14="http://schemas.microsoft.com/office/powerpoint/2010/main">
+    <mc:Choice Requires="p14">
       <p:transition spd="med" p14:dur="700" advTm="1000">
         <p:fade/>
       </p:transition>
     </mc:Choice>
-    <mc:Fallback>
+    <mc:Fallback xmlns="">
       <p:transition spd="med" advTm="1000">
         <p:fade/>
       </p:transition>
@@ -15411,7 +15411,7 @@
 
 <file path=ppt/slides/slide5.xml><?xml version="1.0" encoding="utf-8"?>
 <p:sld xmlns:a="http://schemas.openxmlformats.org/drawingml/2006/main" xmlns:r="http://schemas.openxmlformats.org/officeDocument/2006/relationships" xmlns:p="http://schemas.openxmlformats.org/presentationml/2006/main">
-  <p:cSld name="PPSlideStart_201604251912548146_ae68199">
+  <p:cSld name="PPSlideStart_201604261127234502_2dc5bd6">
     <p:spTree>
       <p:nvGrpSpPr>
         <p:cNvPr id="1" name=""/>
@@ -15478,7 +15478,7 @@
         </p:nvSpPr>
         <p:spPr>
           <a:xfrm>
-            <a:off x="4448748" y="2227316"/>
+            <a:off x="2483768" y="2227316"/>
             <a:ext cx="2643532" cy="617423"/>
           </a:xfrm>
           <a:prstGeom prst="rect">
@@ -15581,7 +15581,7 @@
         </p:nvSpPr>
         <p:spPr>
           <a:xfrm>
-            <a:off x="5112060" y="4658167"/>
+            <a:off x="6048164" y="4658167"/>
             <a:ext cx="1980220" cy="617423"/>
           </a:xfrm>
           <a:prstGeom prst="rect">
@@ -15634,7 +15634,7 @@
         </p:nvSpPr>
         <p:spPr>
           <a:xfrm>
-            <a:off x="5780557" y="5619889"/>
+            <a:off x="5292080" y="5619889"/>
             <a:ext cx="1311723" cy="617423"/>
           </a:xfrm>
           <a:prstGeom prst="rect">
@@ -15746,6 +15746,9 @@
                     <p:cTn id="3" fill="hold">
                       <p:stCondLst>
                         <p:cond delay="indefinite"/>
+                        <p:cond evt="onBegin" delay="0">
+                          <p:tn val="2"/>
+                        </p:cond>
                       </p:stCondLst>
                       <p:childTnLst>
                         <p:par>
@@ -15755,7 +15758,7 @@
                             </p:stCondLst>
                             <p:childTnLst>
                               <p:par>
-                                <p:cTn id="5" presetID="10" presetClass="entr" presetSubtype="0" fill="hold" grpId="0" nodeType="clickEffect">
+                                <p:cTn id="5" presetID="10" presetClass="entr" presetSubtype="0" fill="hold" grpId="0" nodeType="afterEffect">
                                   <p:stCondLst>
                                     <p:cond delay="0"/>
                                   </p:stCondLst>
@@ -15763,6 +15766,155 @@
                                     <p:set>
                                       <p:cBhvr>
                                         <p:cTn id="6" dur="1" fill="hold">
+                                          <p:stCondLst>
+                                            <p:cond delay="0"/>
+                                          </p:stCondLst>
+                                        </p:cTn>
+                                        <p:tgtEl>
+                                          <p:spTgt spid="16"/>
+                                        </p:tgtEl>
+                                        <p:attrNameLst>
+                                          <p:attrName>style.visibility</p:attrName>
+                                        </p:attrNameLst>
+                                      </p:cBhvr>
+                                      <p:to>
+                                        <p:strVal val="visible"/>
+                                      </p:to>
+                                    </p:set>
+                                    <p:animEffect transition="in" filter="fade">
+                                      <p:cBhvr>
+                                        <p:cTn id="7" dur="500"/>
+                                        <p:tgtEl>
+                                          <p:spTgt spid="16"/>
+                                        </p:tgtEl>
+                                      </p:cBhvr>
+                                    </p:animEffect>
+                                  </p:childTnLst>
+                                </p:cTn>
+                              </p:par>
+                              <p:par>
+                                <p:cTn id="8" presetID="10" presetClass="entr" presetSubtype="0" fill="hold" grpId="0" nodeType="withEffect">
+                                  <p:stCondLst>
+                                    <p:cond delay="0"/>
+                                  </p:stCondLst>
+                                  <p:childTnLst>
+                                    <p:set>
+                                      <p:cBhvr>
+                                        <p:cTn id="9" dur="1" fill="hold">
+                                          <p:stCondLst>
+                                            <p:cond delay="0"/>
+                                          </p:stCondLst>
+                                        </p:cTn>
+                                        <p:tgtEl>
+                                          <p:spTgt spid="18"/>
+                                        </p:tgtEl>
+                                        <p:attrNameLst>
+                                          <p:attrName>style.visibility</p:attrName>
+                                        </p:attrNameLst>
+                                      </p:cBhvr>
+                                      <p:to>
+                                        <p:strVal val="visible"/>
+                                      </p:to>
+                                    </p:set>
+                                    <p:animEffect transition="in" filter="fade">
+                                      <p:cBhvr>
+                                        <p:cTn id="10" dur="500"/>
+                                        <p:tgtEl>
+                                          <p:spTgt spid="18"/>
+                                        </p:tgtEl>
+                                      </p:cBhvr>
+                                    </p:animEffect>
+                                  </p:childTnLst>
+                                </p:cTn>
+                              </p:par>
+                              <p:par>
+                                <p:cTn id="11" presetID="10" presetClass="entr" presetSubtype="0" fill="hold" grpId="0" nodeType="withEffect">
+                                  <p:stCondLst>
+                                    <p:cond delay="0"/>
+                                  </p:stCondLst>
+                                  <p:childTnLst>
+                                    <p:set>
+                                      <p:cBhvr>
+                                        <p:cTn id="12" dur="1" fill="hold">
+                                          <p:stCondLst>
+                                            <p:cond delay="0"/>
+                                          </p:stCondLst>
+                                        </p:cTn>
+                                        <p:tgtEl>
+                                          <p:spTgt spid="20"/>
+                                        </p:tgtEl>
+                                        <p:attrNameLst>
+                                          <p:attrName>style.visibility</p:attrName>
+                                        </p:attrNameLst>
+                                      </p:cBhvr>
+                                      <p:to>
+                                        <p:strVal val="visible"/>
+                                      </p:to>
+                                    </p:set>
+                                    <p:animEffect transition="in" filter="fade">
+                                      <p:cBhvr>
+                                        <p:cTn id="13" dur="500"/>
+                                        <p:tgtEl>
+                                          <p:spTgt spid="20"/>
+                                        </p:tgtEl>
+                                      </p:cBhvr>
+                                    </p:animEffect>
+                                  </p:childTnLst>
+                                </p:cTn>
+                              </p:par>
+                              <p:par>
+                                <p:cTn id="14" presetID="10" presetClass="entr" presetSubtype="0" fill="hold" grpId="0" nodeType="withEffect">
+                                  <p:stCondLst>
+                                    <p:cond delay="0"/>
+                                  </p:stCondLst>
+                                  <p:childTnLst>
+                                    <p:set>
+                                      <p:cBhvr>
+                                        <p:cTn id="15" dur="1" fill="hold">
+                                          <p:stCondLst>
+                                            <p:cond delay="0"/>
+                                          </p:stCondLst>
+                                        </p:cTn>
+                                        <p:tgtEl>
+                                          <p:spTgt spid="11"/>
+                                        </p:tgtEl>
+                                        <p:attrNameLst>
+                                          <p:attrName>style.visibility</p:attrName>
+                                        </p:attrNameLst>
+                                      </p:cBhvr>
+                                      <p:to>
+                                        <p:strVal val="visible"/>
+                                      </p:to>
+                                    </p:set>
+                                    <p:animEffect transition="in" filter="fade">
+                                      <p:cBhvr>
+                                        <p:cTn id="16" dur="500"/>
+                                        <p:tgtEl>
+                                          <p:spTgt spid="11"/>
+                                        </p:tgtEl>
+                                      </p:cBhvr>
+                                    </p:animEffect>
+                                  </p:childTnLst>
+                                </p:cTn>
+                              </p:par>
+                            </p:childTnLst>
+                          </p:cTn>
+                        </p:par>
+                        <p:par>
+                          <p:cTn id="17" fill="hold">
+                            <p:stCondLst>
+                              <p:cond delay="500"/>
+                            </p:stCondLst>
+                            <p:childTnLst>
+                              <p:par>
+                                <p:cTn id="18" presetID="10" presetClass="entr" presetSubtype="0" fill="hold" grpId="0" nodeType="afterEffect">
+                                  <p:stCondLst>
+                                    <p:cond delay="0"/>
+                                  </p:stCondLst>
+                                  <p:childTnLst>
+                                    <p:set>
+                                      <p:cBhvr>
+                                        <p:cTn id="19" dur="1" fill="hold">
                                           <p:stCondLst>
                                             <p:cond delay="0"/>
                                           </p:stCondLst>
@@ -15780,7 +15932,7 @@
                                     </p:set>
                                     <p:animEffect transition="in" filter="fade">
                                       <p:cBhvr>
-                                        <p:cTn id="7" dur="500"/>
+                                        <p:cTn id="20" dur="500"/>
                                         <p:tgtEl>
                                           <p:spTgt spid="6"/>
                                         </p:tgtEl>
@@ -15793,20 +15945,20 @@
                           </p:cTn>
                         </p:par>
                         <p:par>
-                          <p:cTn id="8" fill="hold">
+                          <p:cTn id="21" fill="hold">
                             <p:stCondLst>
-                              <p:cond delay="500"/>
+                              <p:cond delay="1000"/>
                             </p:stCondLst>
                             <p:childTnLst>
                               <p:par>
-                                <p:cTn id="9" presetID="16" presetClass="entr" presetSubtype="42" fill="hold" nodeType="afterEffect">
+                                <p:cTn id="22" presetID="16" presetClass="entr" presetSubtype="42" fill="hold" nodeType="afterEffect">
                                   <p:stCondLst>
                                     <p:cond delay="0"/>
                                   </p:stCondLst>
                                   <p:childTnLst>
                                     <p:set>
                                       <p:cBhvr>
-                                        <p:cTn id="10" dur="1" fill="hold">
+                                        <p:cTn id="23" dur="1" fill="hold">
                                           <p:stCondLst>
                                             <p:cond delay="0"/>
                                           </p:stCondLst>
@@ -15824,7 +15976,7 @@
                                     </p:set>
                                     <p:animEffect transition="in" filter="barn(outHorizontal)">
                                       <p:cBhvr>
-                                        <p:cTn id="11" dur="500"/>
+                                        <p:cTn id="24" dur="250"/>
                                         <p:tgtEl>
                                           <p:spTgt spid="8"/>
                                         </p:tgtEl>
@@ -15862,6 +16014,10 @@
     </p:tnLst>
     <p:bldLst>
       <p:bldP spid="6" grpId="0"/>
+      <p:bldP spid="16" grpId="0" animBg="1"/>
+      <p:bldP spid="18" grpId="0" animBg="1"/>
+      <p:bldP spid="20" grpId="0" animBg="1"/>
+      <p:bldP spid="11" grpId="0" animBg="1"/>
     </p:bldLst>
   </p:timing>
 </p:sld>
@@ -15869,7 +16025,7 @@
 
 <file path=ppt/slides/slide6.xml><?xml version="1.0" encoding="utf-8"?>
 <p:sld xmlns:a="http://schemas.openxmlformats.org/drawingml/2006/main" xmlns:r="http://schemas.openxmlformats.org/officeDocument/2006/relationships" xmlns:p="http://schemas.openxmlformats.org/presentationml/2006/main">
-  <p:cSld name="PPSlideAnimated201604251912548026">
+  <p:cSld name="PPSlideAnimated201604261127234272">
     <p:spTree>
       <p:nvGrpSpPr>
         <p:cNvPr id="1" name=""/>
@@ -15936,7 +16092,7 @@
         </p:nvSpPr>
         <p:spPr>
           <a:xfrm>
-            <a:off x="4448748" y="2227316"/>
+            <a:off x="2483768" y="2227316"/>
             <a:ext cx="2643532" cy="617423"/>
           </a:xfrm>
           <a:prstGeom prst="rect">
@@ -16039,7 +16195,7 @@
         </p:nvSpPr>
         <p:spPr>
           <a:xfrm>
-            <a:off x="5112060" y="4658167"/>
+            <a:off x="6048164" y="4658167"/>
             <a:ext cx="1980220" cy="617423"/>
           </a:xfrm>
           <a:prstGeom prst="rect">
@@ -16092,7 +16248,7 @@
         </p:nvSpPr>
         <p:spPr>
           <a:xfrm>
-            <a:off x="5780557" y="5619889"/>
+            <a:off x="5292080" y="5619889"/>
             <a:ext cx="1311723" cy="617423"/>
           </a:xfrm>
           <a:prstGeom prst="rect">
@@ -16172,7 +16328,7 @@
       </p:cxnSp>
       <p:pic>
         <p:nvPicPr>
-          <p:cNvPr id="2" name="PPTIndicator201604251912548266"/>
+          <p:cNvPr id="2" name="PPTIndicator201604261127234642"/>
           <p:cNvPicPr>
             <a:picLocks/>
           </p:cNvPicPr>
@@ -16203,7 +16359,7 @@
     </p:spTree>
     <p:extLst>
       <p:ext uri="{BB962C8B-B14F-4D97-AF65-F5344CB8AC3E}">
-        <p14:creationId xmlns:p14="http://schemas.microsoft.com/office/powerpoint/2010/main" val="875900345"/>
+        <p14:creationId xmlns:p14="http://schemas.microsoft.com/office/powerpoint/2010/main" val="97996917"/>
       </p:ext>
     </p:extLst>
   </p:cSld>
@@ -16301,7 +16457,7 @@
                                     <p:cond delay="0"/>
                                   </p:stCondLst>
                                   <p:childTnLst>
-                                    <p:animMotion origin="layout" path="M 0 0 C -0.03952548 0 -0.03952548 0 -0.07905095 0 E" pathEditMode="relative" ptsTypes="">
+                                    <p:animMotion origin="layout" path="M 0 0 C 0.06792092 0 0.06792092 0 0.1358418 0 E" pathEditMode="relative" ptsTypes="">
                                       <p:cBhvr>
                                         <p:cTn id="10" dur="500" fill="hold"/>
                                         <p:tgtEl>
@@ -16322,7 +16478,7 @@
                                     <p:cond delay="0"/>
                                   </p:stCondLst>
                                   <p:childTnLst>
-                                    <p:animMotion origin="layout" path="M 0 0 C -0.07579583 0 -0.07579583 0 -0.1515917 0 E" pathEditMode="relative" ptsTypes="">
+                                    <p:animMotion origin="layout" path="M 0 0 C -0.1269826 0 -0.1269826 0 -0.2539653 0 E" pathEditMode="relative" ptsTypes="">
                                       <p:cBhvr>
                                         <p:cTn id="12" dur="500" fill="hold"/>
                                         <p:tgtEl>
@@ -16343,7 +16499,7 @@
                                     <p:cond delay="0"/>
                                   </p:stCondLst>
                                   <p:childTnLst>
-                                    <p:animMotion origin="layout" path="M 0 0 C -0.1123497 0 -0.1123497 0 -0.2246994 0 E" pathEditMode="relative" ptsTypes="">
+                                    <p:animMotion origin="layout" path="M 0 0 C -0.08563945 0 -0.08563945 0 -0.1712789 0 E" pathEditMode="relative" ptsTypes="">
                                       <p:cBhvr>
                                         <p:cTn id="14" dur="500" fill="hold"/>
                                         <p:tgtEl>
@@ -16396,7 +16552,7 @@
 
 <file path=ppt/slides/slide7.xml><?xml version="1.0" encoding="utf-8"?>
 <p:sld xmlns:a="http://schemas.openxmlformats.org/drawingml/2006/main" xmlns:r="http://schemas.openxmlformats.org/officeDocument/2006/relationships" xmlns:p="http://schemas.openxmlformats.org/presentationml/2006/main">
-  <p:cSld name="PPSlideEnd_201604251912548146_4fafa18">
+  <p:cSld name="PPSlideEnd_201604261127234512_ca74bc3">
     <p:spTree>
       <p:nvGrpSpPr>
         <p:cNvPr id="1" name=""/>
@@ -16707,13 +16863,13 @@
   <p:clrMapOvr>
     <a:masterClrMapping/>
   </p:clrMapOvr>
-  <mc:AlternateContent xmlns:mc="http://schemas.openxmlformats.org/markup-compatibility/2006">
-    <mc:Choice xmlns:p14="http://schemas.microsoft.com/office/powerpoint/2010/main" Requires="p14">
+  <mc:AlternateContent xmlns:mc="http://schemas.openxmlformats.org/markup-compatibility/2006" xmlns:p14="http://schemas.microsoft.com/office/powerpoint/2010/main">
+    <mc:Choice Requires="p14">
       <p:transition spd="med" p14:dur="700" advTm="1000">
         <p:fade/>
       </p:transition>
     </mc:Choice>
-    <mc:Fallback>
+    <mc:Fallback xmlns="">
       <p:transition spd="med" advTm="1000">
         <p:fade/>
       </p:transition>
@@ -16750,7 +16906,7 @@
                                   <p:childTnLst>
                                     <p:animEffect transition="out" filter="barn(outHorizontal)">
                                       <p:cBhvr>
-                                        <p:cTn id="6" dur="500"/>
+                                        <p:cTn id="6" dur="250"/>
                                         <p:tgtEl>
                                           <p:spTgt spid="21"/>
                                         </p:tgtEl>
@@ -16760,7 +16916,7 @@
                                       <p:cBhvr>
                                         <p:cTn id="7" dur="1" fill="hold">
                                           <p:stCondLst>
-                                            <p:cond delay="499"/>
+                                            <p:cond delay="249"/>
                                           </p:stCondLst>
                                         </p:cTn>
                                         <p:tgtEl>
@@ -17298,7 +17454,7 @@
                                     </p:set>
                                     <p:animEffect transition="in" filter="wipe(up)">
                                       <p:cBhvr>
-                                        <p:cTn id="11" dur="500"/>
+                                        <p:cTn id="11" dur="250"/>
                                         <p:tgtEl>
                                           <p:spTgt spid="3"/>
                                         </p:tgtEl>
@@ -17333,7 +17489,7 @@
                                     </p:set>
                                     <p:animEffect transition="in" filter="wipe(down)">
                                       <p:cBhvr>
-                                        <p:cTn id="14" dur="500"/>
+                                        <p:cTn id="14" dur="250"/>
                                         <p:tgtEl>
                                           <p:spTgt spid="10"/>
                                         </p:tgtEl>
@@ -17368,7 +17524,7 @@
                                     </p:set>
                                     <p:animEffect transition="in" filter="wipe(down)">
                                       <p:cBhvr>
-                                        <p:cTn id="17" dur="500"/>
+                                        <p:cTn id="17" dur="250"/>
                                         <p:tgtEl>
                                           <p:spTgt spid="12"/>
                                         </p:tgtEl>
@@ -17826,11 +17982,11 @@
   <p:clrMapOvr>
     <a:masterClrMapping/>
   </p:clrMapOvr>
-  <mc:AlternateContent xmlns:mc="http://schemas.openxmlformats.org/markup-compatibility/2006">
-    <mc:Choice xmlns:p14="http://schemas.microsoft.com/office/powerpoint/2010/main" Requires="p14">
+  <mc:AlternateContent xmlns:mc="http://schemas.openxmlformats.org/markup-compatibility/2006" xmlns:p14="http://schemas.microsoft.com/office/powerpoint/2010/main">
+    <mc:Choice Requires="p14">
       <p:transition spd="med" p14:dur="700" advClick="0" advTm="0"/>
     </mc:Choice>
-    <mc:Fallback>
+    <mc:Fallback xmlns="">
       <p:transition spd="med" advClick="0" advTm="0"/>
     </mc:Fallback>
   </mc:AlternateContent>

</xml_diff>

<commit_message>
Update PowerPointLabs website front page #1473  (#1477)
* Add pptx for new lab gifs
</commit_message>
<xml_diff>
--- a/doc/PositionsLab gif.pptx
+++ b/doc/PositionsLab gif.pptx
@@ -5,7 +5,7 @@
     <p:sldMasterId id="2147483660" r:id="rId1"/>
   </p:sldMasterIdLst>
   <p:sldIdLst>
-    <p:sldId id="394" r:id="rId2"/>
+    <p:sldId id="398" r:id="rId2"/>
     <p:sldId id="337" r:id="rId3"/>
     <p:sldId id="375" r:id="rId4"/>
     <p:sldId id="366" r:id="rId5"/>
@@ -130,8 +130,27 @@
       </a:defRPr>
     </a:lvl9pPr>
   </p:defaultTextStyle>
-  <p:extLst/>
+  <p:extLst>
+    <p:ext uri="{EFAFB233-063F-42B5-8137-9DF3F51BA10A}">
+      <p15:sldGuideLst xmlns:p15="http://schemas.microsoft.com/office/powerpoint/2012/main">
+        <p15:guide id="1" orient="horz" pos="2160">
+          <p15:clr>
+            <a:srgbClr val="A4A3A4"/>
+          </p15:clr>
+        </p15:guide>
+        <p15:guide id="2" pos="2880">
+          <p15:clr>
+            <a:srgbClr val="A4A3A4"/>
+          </p15:clr>
+        </p15:guide>
+      </p15:sldGuideLst>
+    </p:ext>
+  </p:extLst>
 </p:presentation>
+</file>
+
+<file path=ppt/revisionInfo.xml><?xml version="1.0" encoding="utf-8"?>
+<p1510:revInfo xmlns:a="http://schemas.openxmlformats.org/drawingml/2006/main" xmlns:r="http://schemas.openxmlformats.org/officeDocument/2006/relationships" xmlns:p1510="http://schemas.microsoft.com/office/powerpoint/2015/10/main"/>
 </file>
 
 <file path=ppt/slideLayouts/slideLayout1.xml><?xml version="1.0" encoding="utf-8"?>
@@ -172,10 +191,9 @@
           <a:lstStyle/>
           <a:p>
             <a:r>
-              <a:rPr lang="en-US" smtClean="0"/>
+              <a:rPr lang="en-US"/>
               <a:t>Click to edit Master title style</a:t>
             </a:r>
-            <a:endParaRPr lang="en-US"/>
           </a:p>
         </p:txBody>
       </p:sp>
@@ -291,10 +309,9 @@
           </a:lstStyle>
           <a:p>
             <a:r>
-              <a:rPr lang="en-US" smtClean="0"/>
+              <a:rPr lang="en-US"/>
               <a:t>Click to edit Master subtitle style</a:t>
             </a:r>
-            <a:endParaRPr lang="en-US"/>
           </a:p>
         </p:txBody>
       </p:sp>
@@ -322,7 +339,7 @@
                 </a:solidFill>
               </a:rPr>
               <a:pPr/>
-              <a:t>4/26/2016</a:t>
+              <a:t>6/29/2017</a:t>
             </a:fld>
             <a:endParaRPr lang="en-US">
               <a:solidFill>
@@ -441,10 +458,9 @@
           <a:lstStyle/>
           <a:p>
             <a:r>
-              <a:rPr lang="en-US" smtClean="0"/>
+              <a:rPr lang="en-US"/>
               <a:t>Click to edit Master title style</a:t>
             </a:r>
-            <a:endParaRPr lang="en-US"/>
           </a:p>
         </p:txBody>
       </p:sp>
@@ -465,38 +481,37 @@
           <a:p>
             <a:pPr lvl="0"/>
             <a:r>
-              <a:rPr lang="en-US" smtClean="0"/>
+              <a:rPr lang="en-US"/>
               <a:t>Click to edit Master text styles</a:t>
             </a:r>
           </a:p>
           <a:p>
             <a:pPr lvl="1"/>
             <a:r>
-              <a:rPr lang="en-US" smtClean="0"/>
+              <a:rPr lang="en-US"/>
               <a:t>Second level</a:t>
             </a:r>
           </a:p>
           <a:p>
             <a:pPr lvl="2"/>
             <a:r>
-              <a:rPr lang="en-US" smtClean="0"/>
+              <a:rPr lang="en-US"/>
               <a:t>Third level</a:t>
             </a:r>
           </a:p>
           <a:p>
             <a:pPr lvl="3"/>
             <a:r>
-              <a:rPr lang="en-US" smtClean="0"/>
+              <a:rPr lang="en-US"/>
               <a:t>Fourth level</a:t>
             </a:r>
           </a:p>
           <a:p>
             <a:pPr lvl="4"/>
             <a:r>
-              <a:rPr lang="en-US" smtClean="0"/>
+              <a:rPr lang="en-US"/>
               <a:t>Fifth level</a:t>
             </a:r>
-            <a:endParaRPr lang="en-US"/>
           </a:p>
         </p:txBody>
       </p:sp>
@@ -524,7 +539,7 @@
                 </a:solidFill>
               </a:rPr>
               <a:pPr/>
-              <a:t>4/26/2016</a:t>
+              <a:t>6/29/2017</a:t>
             </a:fld>
             <a:endParaRPr lang="en-US">
               <a:solidFill>
@@ -648,10 +663,9 @@
           <a:lstStyle/>
           <a:p>
             <a:r>
-              <a:rPr lang="en-US" smtClean="0"/>
+              <a:rPr lang="en-US"/>
               <a:t>Click to edit Master title style</a:t>
             </a:r>
-            <a:endParaRPr lang="en-US"/>
           </a:p>
         </p:txBody>
       </p:sp>
@@ -677,38 +691,37 @@
           <a:p>
             <a:pPr lvl="0"/>
             <a:r>
-              <a:rPr lang="en-US" smtClean="0"/>
+              <a:rPr lang="en-US"/>
               <a:t>Click to edit Master text styles</a:t>
             </a:r>
           </a:p>
           <a:p>
             <a:pPr lvl="1"/>
             <a:r>
-              <a:rPr lang="en-US" smtClean="0"/>
+              <a:rPr lang="en-US"/>
               <a:t>Second level</a:t>
             </a:r>
           </a:p>
           <a:p>
             <a:pPr lvl="2"/>
             <a:r>
-              <a:rPr lang="en-US" smtClean="0"/>
+              <a:rPr lang="en-US"/>
               <a:t>Third level</a:t>
             </a:r>
           </a:p>
           <a:p>
             <a:pPr lvl="3"/>
             <a:r>
-              <a:rPr lang="en-US" smtClean="0"/>
+              <a:rPr lang="en-US"/>
               <a:t>Fourth level</a:t>
             </a:r>
           </a:p>
           <a:p>
             <a:pPr lvl="4"/>
             <a:r>
-              <a:rPr lang="en-US" smtClean="0"/>
+              <a:rPr lang="en-US"/>
               <a:t>Fifth level</a:t>
             </a:r>
-            <a:endParaRPr lang="en-US"/>
           </a:p>
         </p:txBody>
       </p:sp>
@@ -736,7 +749,7 @@
                 </a:solidFill>
               </a:rPr>
               <a:pPr/>
-              <a:t>4/26/2016</a:t>
+              <a:t>6/29/2017</a:t>
             </a:fld>
             <a:endParaRPr lang="en-US">
               <a:solidFill>
@@ -855,7 +868,7 @@
           <a:lstStyle/>
           <a:p>
             <a:r>
-              <a:rPr lang="en-US" smtClean="0"/>
+              <a:rPr lang="en-US"/>
               <a:t>Click to edit Master title style</a:t>
             </a:r>
             <a:endParaRPr lang="en-SG"/>
@@ -879,35 +892,35 @@
           <a:p>
             <a:pPr lvl="0"/>
             <a:r>
-              <a:rPr lang="en-US" smtClean="0"/>
+              <a:rPr lang="en-US"/>
               <a:t>Click to edit Master text styles</a:t>
             </a:r>
           </a:p>
           <a:p>
             <a:pPr lvl="1"/>
             <a:r>
-              <a:rPr lang="en-US" smtClean="0"/>
+              <a:rPr lang="en-US"/>
               <a:t>Second level</a:t>
             </a:r>
           </a:p>
           <a:p>
             <a:pPr lvl="2"/>
             <a:r>
-              <a:rPr lang="en-US" smtClean="0"/>
+              <a:rPr lang="en-US"/>
               <a:t>Third level</a:t>
             </a:r>
           </a:p>
           <a:p>
             <a:pPr lvl="3"/>
             <a:r>
-              <a:rPr lang="en-US" smtClean="0"/>
+              <a:rPr lang="en-US"/>
               <a:t>Fourth level</a:t>
             </a:r>
           </a:p>
           <a:p>
             <a:pPr lvl="4"/>
             <a:r>
-              <a:rPr lang="en-US" smtClean="0"/>
+              <a:rPr lang="en-US"/>
               <a:t>Fifth level</a:t>
             </a:r>
             <a:endParaRPr lang="en-SG"/>
@@ -938,7 +951,7 @@
                 </a:solidFill>
               </a:rPr>
               <a:pPr/>
-              <a:t>4/26/2016</a:t>
+              <a:t>6/29/2017</a:t>
             </a:fld>
             <a:endParaRPr lang="en-US">
               <a:solidFill>
@@ -1057,10 +1070,9 @@
           <a:lstStyle/>
           <a:p>
             <a:r>
-              <a:rPr lang="en-US" smtClean="0"/>
+              <a:rPr lang="en-US"/>
               <a:t>Click to edit Master title style</a:t>
             </a:r>
-            <a:endParaRPr lang="en-US"/>
           </a:p>
         </p:txBody>
       </p:sp>
@@ -1081,38 +1093,37 @@
           <a:p>
             <a:pPr lvl="0"/>
             <a:r>
-              <a:rPr lang="en-US" smtClean="0"/>
+              <a:rPr lang="en-US"/>
               <a:t>Click to edit Master text styles</a:t>
             </a:r>
           </a:p>
           <a:p>
             <a:pPr lvl="1"/>
             <a:r>
-              <a:rPr lang="en-US" smtClean="0"/>
+              <a:rPr lang="en-US"/>
               <a:t>Second level</a:t>
             </a:r>
           </a:p>
           <a:p>
             <a:pPr lvl="2"/>
             <a:r>
-              <a:rPr lang="en-US" smtClean="0"/>
+              <a:rPr lang="en-US"/>
               <a:t>Third level</a:t>
             </a:r>
           </a:p>
           <a:p>
             <a:pPr lvl="3"/>
             <a:r>
-              <a:rPr lang="en-US" smtClean="0"/>
+              <a:rPr lang="en-US"/>
               <a:t>Fourth level</a:t>
             </a:r>
           </a:p>
           <a:p>
             <a:pPr lvl="4"/>
             <a:r>
-              <a:rPr lang="en-US" smtClean="0"/>
+              <a:rPr lang="en-US"/>
               <a:t>Fifth level</a:t>
             </a:r>
-            <a:endParaRPr lang="en-US"/>
           </a:p>
         </p:txBody>
       </p:sp>
@@ -1140,7 +1151,7 @@
                 </a:solidFill>
               </a:rPr>
               <a:pPr/>
-              <a:t>4/26/2016</a:t>
+              <a:t>6/29/2017</a:t>
             </a:fld>
             <a:endParaRPr lang="en-US">
               <a:solidFill>
@@ -1223,13 +1234,6 @@
   <p:clrMapOvr>
     <a:masterClrMapping/>
   </p:clrMapOvr>
-  <p:timing>
-    <p:tnLst>
-      <p:par>
-        <p:cTn id="1" dur="indefinite" restart="never" nodeType="tmRoot"/>
-      </p:par>
-    </p:tnLst>
-  </p:timing>
 </p:sldLayout>
 </file>
 
@@ -1275,10 +1279,9 @@
           </a:lstStyle>
           <a:p>
             <a:r>
-              <a:rPr lang="en-US" smtClean="0"/>
+              <a:rPr lang="en-US"/>
               <a:t>Click to edit Master title style</a:t>
             </a:r>
-            <a:endParaRPr lang="en-US"/>
           </a:p>
         </p:txBody>
       </p:sp>
@@ -1395,7 +1398,7 @@
           <a:p>
             <a:pPr lvl="0"/>
             <a:r>
-              <a:rPr lang="en-US" smtClean="0"/>
+              <a:rPr lang="en-US"/>
               <a:t>Click to edit Master text styles</a:t>
             </a:r>
           </a:p>
@@ -1425,7 +1428,7 @@
                 </a:solidFill>
               </a:rPr>
               <a:pPr/>
-              <a:t>4/26/2016</a:t>
+              <a:t>6/29/2017</a:t>
             </a:fld>
             <a:endParaRPr lang="en-US">
               <a:solidFill>
@@ -1544,10 +1547,9 @@
           <a:lstStyle/>
           <a:p>
             <a:r>
-              <a:rPr lang="en-US" smtClean="0"/>
+              <a:rPr lang="en-US"/>
               <a:t>Click to edit Master title style</a:t>
             </a:r>
-            <a:endParaRPr lang="en-US"/>
           </a:p>
         </p:txBody>
       </p:sp>
@@ -1601,38 +1603,37 @@
           <a:p>
             <a:pPr lvl="0"/>
             <a:r>
-              <a:rPr lang="en-US" smtClean="0"/>
+              <a:rPr lang="en-US"/>
               <a:t>Click to edit Master text styles</a:t>
             </a:r>
           </a:p>
           <a:p>
             <a:pPr lvl="1"/>
             <a:r>
-              <a:rPr lang="en-US" smtClean="0"/>
+              <a:rPr lang="en-US"/>
               <a:t>Second level</a:t>
             </a:r>
           </a:p>
           <a:p>
             <a:pPr lvl="2"/>
             <a:r>
-              <a:rPr lang="en-US" smtClean="0"/>
+              <a:rPr lang="en-US"/>
               <a:t>Third level</a:t>
             </a:r>
           </a:p>
           <a:p>
             <a:pPr lvl="3"/>
             <a:r>
-              <a:rPr lang="en-US" smtClean="0"/>
+              <a:rPr lang="en-US"/>
               <a:t>Fourth level</a:t>
             </a:r>
           </a:p>
           <a:p>
             <a:pPr lvl="4"/>
             <a:r>
-              <a:rPr lang="en-US" smtClean="0"/>
+              <a:rPr lang="en-US"/>
               <a:t>Fifth level</a:t>
             </a:r>
-            <a:endParaRPr lang="en-US"/>
           </a:p>
         </p:txBody>
       </p:sp>
@@ -1686,38 +1687,37 @@
           <a:p>
             <a:pPr lvl="0"/>
             <a:r>
-              <a:rPr lang="en-US" smtClean="0"/>
+              <a:rPr lang="en-US"/>
               <a:t>Click to edit Master text styles</a:t>
             </a:r>
           </a:p>
           <a:p>
             <a:pPr lvl="1"/>
             <a:r>
-              <a:rPr lang="en-US" smtClean="0"/>
+              <a:rPr lang="en-US"/>
               <a:t>Second level</a:t>
             </a:r>
           </a:p>
           <a:p>
             <a:pPr lvl="2"/>
             <a:r>
-              <a:rPr lang="en-US" smtClean="0"/>
+              <a:rPr lang="en-US"/>
               <a:t>Third level</a:t>
             </a:r>
           </a:p>
           <a:p>
             <a:pPr lvl="3"/>
             <a:r>
-              <a:rPr lang="en-US" smtClean="0"/>
+              <a:rPr lang="en-US"/>
               <a:t>Fourth level</a:t>
             </a:r>
           </a:p>
           <a:p>
             <a:pPr lvl="4"/>
             <a:r>
-              <a:rPr lang="en-US" smtClean="0"/>
+              <a:rPr lang="en-US"/>
               <a:t>Fifth level</a:t>
             </a:r>
-            <a:endParaRPr lang="en-US"/>
           </a:p>
         </p:txBody>
       </p:sp>
@@ -1745,7 +1745,7 @@
                 </a:solidFill>
               </a:rPr>
               <a:pPr/>
-              <a:t>4/26/2016</a:t>
+              <a:t>6/29/2017</a:t>
             </a:fld>
             <a:endParaRPr lang="en-US">
               <a:solidFill>
@@ -1873,10 +1873,9 @@
           </a:lstStyle>
           <a:p>
             <a:r>
-              <a:rPr lang="en-US" smtClean="0"/>
+              <a:rPr lang="en-US"/>
               <a:t>Click to edit Master title style</a:t>
             </a:r>
-            <a:endParaRPr lang="en-US"/>
           </a:p>
         </p:txBody>
       </p:sp>
@@ -1939,7 +1938,7 @@
           <a:p>
             <a:pPr lvl="0"/>
             <a:r>
-              <a:rPr lang="en-US" smtClean="0"/>
+              <a:rPr lang="en-US"/>
               <a:t>Click to edit Master text styles</a:t>
             </a:r>
           </a:p>
@@ -1995,38 +1994,37 @@
           <a:p>
             <a:pPr lvl="0"/>
             <a:r>
-              <a:rPr lang="en-US" smtClean="0"/>
+              <a:rPr lang="en-US"/>
               <a:t>Click to edit Master text styles</a:t>
             </a:r>
           </a:p>
           <a:p>
             <a:pPr lvl="1"/>
             <a:r>
-              <a:rPr lang="en-US" smtClean="0"/>
+              <a:rPr lang="en-US"/>
               <a:t>Second level</a:t>
             </a:r>
           </a:p>
           <a:p>
             <a:pPr lvl="2"/>
             <a:r>
-              <a:rPr lang="en-US" smtClean="0"/>
+              <a:rPr lang="en-US"/>
               <a:t>Third level</a:t>
             </a:r>
           </a:p>
           <a:p>
             <a:pPr lvl="3"/>
             <a:r>
-              <a:rPr lang="en-US" smtClean="0"/>
+              <a:rPr lang="en-US"/>
               <a:t>Fourth level</a:t>
             </a:r>
           </a:p>
           <a:p>
             <a:pPr lvl="4"/>
             <a:r>
-              <a:rPr lang="en-US" smtClean="0"/>
+              <a:rPr lang="en-US"/>
               <a:t>Fifth level</a:t>
             </a:r>
-            <a:endParaRPr lang="en-US"/>
           </a:p>
         </p:txBody>
       </p:sp>
@@ -2089,7 +2087,7 @@
           <a:p>
             <a:pPr lvl="0"/>
             <a:r>
-              <a:rPr lang="en-US" smtClean="0"/>
+              <a:rPr lang="en-US"/>
               <a:t>Click to edit Master text styles</a:t>
             </a:r>
           </a:p>
@@ -2145,38 +2143,37 @@
           <a:p>
             <a:pPr lvl="0"/>
             <a:r>
-              <a:rPr lang="en-US" smtClean="0"/>
+              <a:rPr lang="en-US"/>
               <a:t>Click to edit Master text styles</a:t>
             </a:r>
           </a:p>
           <a:p>
             <a:pPr lvl="1"/>
             <a:r>
-              <a:rPr lang="en-US" smtClean="0"/>
+              <a:rPr lang="en-US"/>
               <a:t>Second level</a:t>
             </a:r>
           </a:p>
           <a:p>
             <a:pPr lvl="2"/>
             <a:r>
-              <a:rPr lang="en-US" smtClean="0"/>
+              <a:rPr lang="en-US"/>
               <a:t>Third level</a:t>
             </a:r>
           </a:p>
           <a:p>
             <a:pPr lvl="3"/>
             <a:r>
-              <a:rPr lang="en-US" smtClean="0"/>
+              <a:rPr lang="en-US"/>
               <a:t>Fourth level</a:t>
             </a:r>
           </a:p>
           <a:p>
             <a:pPr lvl="4"/>
             <a:r>
-              <a:rPr lang="en-US" smtClean="0"/>
+              <a:rPr lang="en-US"/>
               <a:t>Fifth level</a:t>
             </a:r>
-            <a:endParaRPr lang="en-US"/>
           </a:p>
         </p:txBody>
       </p:sp>
@@ -2204,7 +2201,7 @@
                 </a:solidFill>
               </a:rPr>
               <a:pPr/>
-              <a:t>4/26/2016</a:t>
+              <a:t>6/29/2017</a:t>
             </a:fld>
             <a:endParaRPr lang="en-US">
               <a:solidFill>
@@ -2323,10 +2320,9 @@
           <a:lstStyle/>
           <a:p>
             <a:r>
-              <a:rPr lang="en-US" smtClean="0"/>
+              <a:rPr lang="en-US"/>
               <a:t>Click to edit Master title style</a:t>
             </a:r>
-            <a:endParaRPr lang="en-US"/>
           </a:p>
         </p:txBody>
       </p:sp>
@@ -2354,7 +2350,7 @@
                 </a:solidFill>
               </a:rPr>
               <a:pPr/>
-              <a:t>4/26/2016</a:t>
+              <a:t>6/29/2017</a:t>
             </a:fld>
             <a:endParaRPr lang="en-US">
               <a:solidFill>
@@ -2481,7 +2477,7 @@
                 </a:solidFill>
               </a:rPr>
               <a:pPr/>
-              <a:t>4/26/2016</a:t>
+              <a:t>6/29/2017</a:t>
             </a:fld>
             <a:endParaRPr lang="en-US">
               <a:solidFill>
@@ -2609,10 +2605,9 @@
           </a:lstStyle>
           <a:p>
             <a:r>
-              <a:rPr lang="en-US" smtClean="0"/>
+              <a:rPr lang="en-US"/>
               <a:t>Click to edit Master title style</a:t>
             </a:r>
-            <a:endParaRPr lang="en-US"/>
           </a:p>
         </p:txBody>
       </p:sp>
@@ -2666,38 +2661,37 @@
           <a:p>
             <a:pPr lvl="0"/>
             <a:r>
-              <a:rPr lang="en-US" smtClean="0"/>
+              <a:rPr lang="en-US"/>
               <a:t>Click to edit Master text styles</a:t>
             </a:r>
           </a:p>
           <a:p>
             <a:pPr lvl="1"/>
             <a:r>
-              <a:rPr lang="en-US" smtClean="0"/>
+              <a:rPr lang="en-US"/>
               <a:t>Second level</a:t>
             </a:r>
           </a:p>
           <a:p>
             <a:pPr lvl="2"/>
             <a:r>
-              <a:rPr lang="en-US" smtClean="0"/>
+              <a:rPr lang="en-US"/>
               <a:t>Third level</a:t>
             </a:r>
           </a:p>
           <a:p>
             <a:pPr lvl="3"/>
             <a:r>
-              <a:rPr lang="en-US" smtClean="0"/>
+              <a:rPr lang="en-US"/>
               <a:t>Fourth level</a:t>
             </a:r>
           </a:p>
           <a:p>
             <a:pPr lvl="4"/>
             <a:r>
-              <a:rPr lang="en-US" smtClean="0"/>
+              <a:rPr lang="en-US"/>
               <a:t>Fifth level</a:t>
             </a:r>
-            <a:endParaRPr lang="en-US"/>
           </a:p>
         </p:txBody>
       </p:sp>
@@ -2760,7 +2754,7 @@
           <a:p>
             <a:pPr lvl="0"/>
             <a:r>
-              <a:rPr lang="en-US" smtClean="0"/>
+              <a:rPr lang="en-US"/>
               <a:t>Click to edit Master text styles</a:t>
             </a:r>
           </a:p>
@@ -2790,7 +2784,7 @@
                 </a:solidFill>
               </a:rPr>
               <a:pPr/>
-              <a:t>4/26/2016</a:t>
+              <a:t>6/29/2017</a:t>
             </a:fld>
             <a:endParaRPr lang="en-US">
               <a:solidFill>
@@ -2918,10 +2912,9 @@
           </a:lstStyle>
           <a:p>
             <a:r>
-              <a:rPr lang="en-US" smtClean="0"/>
+              <a:rPr lang="en-US"/>
               <a:t>Click to edit Master title style</a:t>
             </a:r>
-            <a:endParaRPr lang="en-US"/>
           </a:p>
         </p:txBody>
       </p:sp>
@@ -3045,7 +3038,7 @@
           <a:p>
             <a:pPr lvl="0"/>
             <a:r>
-              <a:rPr lang="en-US" smtClean="0"/>
+              <a:rPr lang="en-US"/>
               <a:t>Click to edit Master text styles</a:t>
             </a:r>
           </a:p>
@@ -3075,7 +3068,7 @@
                 </a:solidFill>
               </a:rPr>
               <a:pPr/>
-              <a:t>4/26/2016</a:t>
+              <a:t>6/29/2017</a:t>
             </a:fld>
             <a:endParaRPr lang="en-US">
               <a:solidFill>
@@ -3212,10 +3205,9 @@
           <a:lstStyle/>
           <a:p>
             <a:r>
-              <a:rPr lang="en-US" smtClean="0"/>
+              <a:rPr lang="en-US"/>
               <a:t>Click to edit Master title style</a:t>
             </a:r>
-            <a:endParaRPr lang="en-US"/>
           </a:p>
         </p:txBody>
       </p:sp>
@@ -3246,38 +3238,37 @@
           <a:p>
             <a:pPr lvl="0"/>
             <a:r>
-              <a:rPr lang="en-US" smtClean="0"/>
+              <a:rPr lang="en-US"/>
               <a:t>Click to edit Master text styles</a:t>
             </a:r>
           </a:p>
           <a:p>
             <a:pPr lvl="1"/>
             <a:r>
-              <a:rPr lang="en-US" smtClean="0"/>
+              <a:rPr lang="en-US"/>
               <a:t>Second level</a:t>
             </a:r>
           </a:p>
           <a:p>
             <a:pPr lvl="2"/>
             <a:r>
-              <a:rPr lang="en-US" smtClean="0"/>
+              <a:rPr lang="en-US"/>
               <a:t>Third level</a:t>
             </a:r>
           </a:p>
           <a:p>
             <a:pPr lvl="3"/>
             <a:r>
-              <a:rPr lang="en-US" smtClean="0"/>
+              <a:rPr lang="en-US"/>
               <a:t>Fourth level</a:t>
             </a:r>
           </a:p>
           <a:p>
             <a:pPr lvl="4"/>
             <a:r>
-              <a:rPr lang="en-US" smtClean="0"/>
+              <a:rPr lang="en-US"/>
               <a:t>Fifth level</a:t>
             </a:r>
-            <a:endParaRPr lang="en-US"/>
           </a:p>
         </p:txBody>
       </p:sp>
@@ -3323,7 +3314,7 @@
                 </a:solidFill>
               </a:rPr>
               <a:pPr/>
-              <a:t>4/26/2016</a:t>
+              <a:t>6/29/2017</a:t>
             </a:fld>
             <a:endParaRPr lang="en-US">
               <a:solidFill>
@@ -3506,13 +3497,6 @@
     <p:sldLayoutId id="2147483671" r:id="rId11"/>
     <p:sldLayoutId id="2147483672" r:id="rId12"/>
   </p:sldLayoutIdLst>
-  <p:timing>
-    <p:tnLst>
-      <p:par>
-        <p:cTn id="1" dur="indefinite" restart="never" nodeType="tmRoot"/>
-      </p:par>
-    </p:tnLst>
-  </p:timing>
   <p:txStyles>
     <p:titleStyle>
       <a:lvl1pPr algn="ctr" defTabSz="914400" rtl="0" eaLnBrk="1" latinLnBrk="0" hangingPunct="1">
@@ -3767,7 +3751,7 @@
 </file>
 
 <file path=ppt/slides/slide1.xml><?xml version="1.0" encoding="utf-8"?>
-<p:sld xmlns:a="http://schemas.openxmlformats.org/drawingml/2006/main" xmlns:r="http://schemas.openxmlformats.org/officeDocument/2006/relationships" xmlns:p="http://schemas.openxmlformats.org/presentationml/2006/main">
+<p:sld xmlns:a="http://schemas.openxmlformats.org/drawingml/2006/main" xmlns:r="http://schemas.openxmlformats.org/officeDocument/2006/relationships" xmlns:p="http://schemas.openxmlformats.org/presentationml/2006/main" show="0">
   <p:cSld>
     <p:spTree>
       <p:nvGrpSpPr>
@@ -3783,554 +3767,10 @@
           <a:chExt cx="0" cy="0"/>
         </a:xfrm>
       </p:grpSpPr>
-      <p:sp>
-        <p:nvSpPr>
-          <p:cNvPr id="16" name="1"/>
-          <p:cNvSpPr>
-            <a:spLocks noChangeAspect="1"/>
-          </p:cNvSpPr>
-          <p:nvPr/>
-        </p:nvSpPr>
-        <p:spPr>
-          <a:xfrm rot="19353635">
-            <a:off x="86732" y="124618"/>
-            <a:ext cx="619200" cy="617423"/>
-          </a:xfrm>
-          <a:prstGeom prst="flowChartConnector">
-            <a:avLst/>
-          </a:prstGeom>
-          <a:solidFill>
-            <a:schemeClr val="accent1">
-              <a:lumMod val="60000"/>
-              <a:lumOff val="40000"/>
-            </a:schemeClr>
-          </a:solidFill>
-          <a:ln>
-            <a:solidFill>
-              <a:schemeClr val="bg1">
-                <a:lumMod val="95000"/>
-              </a:schemeClr>
-            </a:solidFill>
-          </a:ln>
-        </p:spPr>
-        <p:style>
-          <a:lnRef idx="2">
-            <a:schemeClr val="accent1">
-              <a:shade val="50000"/>
-            </a:schemeClr>
-          </a:lnRef>
-          <a:fillRef idx="1">
-            <a:schemeClr val="accent1"/>
-          </a:fillRef>
-          <a:effectRef idx="0">
-            <a:schemeClr val="accent1"/>
-          </a:effectRef>
-          <a:fontRef idx="minor">
-            <a:schemeClr val="lt1"/>
-          </a:fontRef>
-        </p:style>
-        <p:txBody>
-          <a:bodyPr rtlCol="0" anchor="ctr"/>
-          <a:lstStyle/>
-          <a:p>
-            <a:pPr algn="ctr"/>
-            <a:endParaRPr lang="en-SG"/>
-          </a:p>
-        </p:txBody>
-      </p:sp>
-      <p:sp>
-        <p:nvSpPr>
-          <p:cNvPr id="18" name="2"/>
-          <p:cNvSpPr>
-            <a:spLocks noChangeAspect="1"/>
-          </p:cNvSpPr>
-          <p:nvPr/>
-        </p:nvSpPr>
-        <p:spPr>
-          <a:xfrm rot="21257325">
-            <a:off x="8289552" y="3118480"/>
-            <a:ext cx="619200" cy="617423"/>
-          </a:xfrm>
-          <a:prstGeom prst="flowChartConnector">
-            <a:avLst/>
-          </a:prstGeom>
-          <a:solidFill>
-            <a:schemeClr val="accent1">
-              <a:lumMod val="60000"/>
-              <a:lumOff val="40000"/>
-            </a:schemeClr>
-          </a:solidFill>
-          <a:ln>
-            <a:solidFill>
-              <a:schemeClr val="bg1">
-                <a:lumMod val="95000"/>
-              </a:schemeClr>
-            </a:solidFill>
-          </a:ln>
-        </p:spPr>
-        <p:style>
-          <a:lnRef idx="2">
-            <a:schemeClr val="accent1">
-              <a:shade val="50000"/>
-            </a:schemeClr>
-          </a:lnRef>
-          <a:fillRef idx="1">
-            <a:schemeClr val="accent1"/>
-          </a:fillRef>
-          <a:effectRef idx="0">
-            <a:schemeClr val="accent1"/>
-          </a:effectRef>
-          <a:fontRef idx="minor">
-            <a:schemeClr val="lt1"/>
-          </a:fontRef>
-        </p:style>
-        <p:txBody>
-          <a:bodyPr rtlCol="0" anchor="ctr"/>
-          <a:lstStyle/>
-          <a:p>
-            <a:pPr algn="ctr"/>
-            <a:endParaRPr lang="en-SG"/>
-          </a:p>
-        </p:txBody>
-      </p:sp>
-      <p:sp>
-        <p:nvSpPr>
-          <p:cNvPr id="20" name="3"/>
-          <p:cNvSpPr>
-            <a:spLocks noChangeAspect="1"/>
-          </p:cNvSpPr>
-          <p:nvPr/>
-        </p:nvSpPr>
-        <p:spPr>
-          <a:xfrm rot="23193809">
-            <a:off x="82791" y="6117234"/>
-            <a:ext cx="619200" cy="617423"/>
-          </a:xfrm>
-          <a:prstGeom prst="flowChartConnector">
-            <a:avLst/>
-          </a:prstGeom>
-          <a:solidFill>
-            <a:schemeClr val="accent1">
-              <a:lumMod val="60000"/>
-              <a:lumOff val="40000"/>
-            </a:schemeClr>
-          </a:solidFill>
-          <a:ln>
-            <a:solidFill>
-              <a:schemeClr val="bg1">
-                <a:lumMod val="95000"/>
-              </a:schemeClr>
-            </a:solidFill>
-          </a:ln>
-        </p:spPr>
-        <p:style>
-          <a:lnRef idx="2">
-            <a:schemeClr val="accent1">
-              <a:shade val="50000"/>
-            </a:schemeClr>
-          </a:lnRef>
-          <a:fillRef idx="1">
-            <a:schemeClr val="accent1"/>
-          </a:fillRef>
-          <a:effectRef idx="0">
-            <a:schemeClr val="accent1"/>
-          </a:effectRef>
-          <a:fontRef idx="minor">
-            <a:schemeClr val="lt1"/>
-          </a:fontRef>
-        </p:style>
-        <p:txBody>
-          <a:bodyPr rtlCol="0" anchor="ctr"/>
-          <a:lstStyle/>
-          <a:p>
-            <a:pPr algn="ctr"/>
-            <a:endParaRPr lang="en-SG"/>
-          </a:p>
-        </p:txBody>
-      </p:sp>
-      <p:sp>
-        <p:nvSpPr>
-          <p:cNvPr id="11" name="4"/>
-          <p:cNvSpPr>
-            <a:spLocks noChangeAspect="1"/>
-          </p:cNvSpPr>
-          <p:nvPr/>
-        </p:nvSpPr>
-        <p:spPr>
-          <a:xfrm rot="25063704">
-            <a:off x="3715971" y="6099891"/>
-            <a:ext cx="619200" cy="617423"/>
-          </a:xfrm>
-          <a:prstGeom prst="flowChartConnector">
-            <a:avLst/>
-          </a:prstGeom>
-          <a:solidFill>
-            <a:schemeClr val="accent1">
-              <a:lumMod val="60000"/>
-              <a:lumOff val="40000"/>
-            </a:schemeClr>
-          </a:solidFill>
-          <a:ln>
-            <a:solidFill>
-              <a:schemeClr val="bg1">
-                <a:lumMod val="95000"/>
-              </a:schemeClr>
-            </a:solidFill>
-          </a:ln>
-        </p:spPr>
-        <p:style>
-          <a:lnRef idx="2">
-            <a:schemeClr val="accent1">
-              <a:shade val="50000"/>
-            </a:schemeClr>
-          </a:lnRef>
-          <a:fillRef idx="1">
-            <a:schemeClr val="accent1"/>
-          </a:fillRef>
-          <a:effectRef idx="0">
-            <a:schemeClr val="accent1"/>
-          </a:effectRef>
-          <a:fontRef idx="minor">
-            <a:schemeClr val="lt1"/>
-          </a:fontRef>
-        </p:style>
-        <p:txBody>
-          <a:bodyPr rtlCol="0" anchor="ctr"/>
-          <a:lstStyle/>
-          <a:p>
-            <a:pPr algn="ctr"/>
-            <a:endParaRPr lang="en-SG"/>
-          </a:p>
-        </p:txBody>
-      </p:sp>
-      <p:sp>
-        <p:nvSpPr>
-          <p:cNvPr id="3" name="c"/>
-          <p:cNvSpPr>
-            <a:spLocks noChangeAspect="1"/>
-          </p:cNvSpPr>
-          <p:nvPr/>
-        </p:nvSpPr>
-        <p:spPr>
-          <a:xfrm>
-            <a:off x="1353601" y="2908750"/>
-            <a:ext cx="1188539" cy="1188539"/>
-          </a:xfrm>
-          <a:prstGeom prst="flowChartConnector">
-            <a:avLst/>
-          </a:prstGeom>
-          <a:solidFill>
-            <a:srgbClr val="0070C0"/>
-          </a:solidFill>
-          <a:ln>
-            <a:solidFill>
-              <a:schemeClr val="bg1">
-                <a:lumMod val="95000"/>
-              </a:schemeClr>
-            </a:solidFill>
-          </a:ln>
-        </p:spPr>
-        <p:style>
-          <a:lnRef idx="2">
-            <a:schemeClr val="accent1">
-              <a:shade val="50000"/>
-            </a:schemeClr>
-          </a:lnRef>
-          <a:fillRef idx="1">
-            <a:schemeClr val="accent1"/>
-          </a:fillRef>
-          <a:effectRef idx="0">
-            <a:schemeClr val="accent1"/>
-          </a:effectRef>
-          <a:fontRef idx="minor">
-            <a:schemeClr val="lt1"/>
-          </a:fontRef>
-        </p:style>
-        <p:txBody>
-          <a:bodyPr rtlCol="0" anchor="ctr"/>
-          <a:lstStyle/>
-          <a:p>
-            <a:pPr algn="ctr"/>
-            <a:endParaRPr lang="en-SG"/>
-          </a:p>
-        </p:txBody>
-      </p:sp>
-      <p:sp>
-        <p:nvSpPr>
-          <p:cNvPr id="13" name="5"/>
-          <p:cNvSpPr>
-            <a:spLocks noChangeAspect="1"/>
-          </p:cNvSpPr>
-          <p:nvPr/>
-        </p:nvSpPr>
-        <p:spPr>
-          <a:xfrm rot="19353635">
-            <a:off x="3831797" y="124617"/>
-            <a:ext cx="619200" cy="617423"/>
-          </a:xfrm>
-          <a:prstGeom prst="flowChartConnector">
-            <a:avLst/>
-          </a:prstGeom>
-          <a:solidFill>
-            <a:schemeClr val="accent1">
-              <a:lumMod val="60000"/>
-              <a:lumOff val="40000"/>
-            </a:schemeClr>
-          </a:solidFill>
-          <a:ln>
-            <a:solidFill>
-              <a:schemeClr val="bg1">
-                <a:lumMod val="95000"/>
-              </a:schemeClr>
-            </a:solidFill>
-          </a:ln>
-        </p:spPr>
-        <p:style>
-          <a:lnRef idx="2">
-            <a:schemeClr val="accent1">
-              <a:shade val="50000"/>
-            </a:schemeClr>
-          </a:lnRef>
-          <a:fillRef idx="1">
-            <a:schemeClr val="accent1"/>
-          </a:fillRef>
-          <a:effectRef idx="0">
-            <a:schemeClr val="accent1"/>
-          </a:effectRef>
-          <a:fontRef idx="minor">
-            <a:schemeClr val="lt1"/>
-          </a:fontRef>
-        </p:style>
-        <p:txBody>
-          <a:bodyPr rtlCol="0" anchor="ctr"/>
-          <a:lstStyle/>
-          <a:p>
-            <a:pPr algn="ctr"/>
-            <a:endParaRPr lang="en-SG"/>
-          </a:p>
-        </p:txBody>
-      </p:sp>
-      <p:sp>
-        <p:nvSpPr>
-          <p:cNvPr id="14" name="6"/>
-          <p:cNvSpPr>
-            <a:spLocks noChangeAspect="1"/>
-          </p:cNvSpPr>
-          <p:nvPr/>
-        </p:nvSpPr>
-        <p:spPr>
-          <a:xfrm rot="21257325">
-            <a:off x="8289551" y="124616"/>
-            <a:ext cx="619200" cy="617423"/>
-          </a:xfrm>
-          <a:prstGeom prst="flowChartConnector">
-            <a:avLst/>
-          </a:prstGeom>
-          <a:solidFill>
-            <a:schemeClr val="accent1">
-              <a:lumMod val="60000"/>
-              <a:lumOff val="40000"/>
-            </a:schemeClr>
-          </a:solidFill>
-          <a:ln>
-            <a:solidFill>
-              <a:schemeClr val="bg1">
-                <a:lumMod val="95000"/>
-              </a:schemeClr>
-            </a:solidFill>
-          </a:ln>
-        </p:spPr>
-        <p:style>
-          <a:lnRef idx="2">
-            <a:schemeClr val="accent1">
-              <a:shade val="50000"/>
-            </a:schemeClr>
-          </a:lnRef>
-          <a:fillRef idx="1">
-            <a:schemeClr val="accent1"/>
-          </a:fillRef>
-          <a:effectRef idx="0">
-            <a:schemeClr val="accent1"/>
-          </a:effectRef>
-          <a:fontRef idx="minor">
-            <a:schemeClr val="lt1"/>
-          </a:fontRef>
-        </p:style>
-        <p:txBody>
-          <a:bodyPr rtlCol="0" anchor="ctr"/>
-          <a:lstStyle/>
-          <a:p>
-            <a:pPr algn="ctr"/>
-            <a:endParaRPr lang="en-SG"/>
-          </a:p>
-        </p:txBody>
-      </p:sp>
-      <p:sp>
-        <p:nvSpPr>
-          <p:cNvPr id="15" name="7"/>
-          <p:cNvSpPr>
-            <a:spLocks noChangeAspect="1"/>
-          </p:cNvSpPr>
-          <p:nvPr/>
-        </p:nvSpPr>
-        <p:spPr>
-          <a:xfrm rot="23193809">
-            <a:off x="82791" y="3194309"/>
-            <a:ext cx="619200" cy="617423"/>
-          </a:xfrm>
-          <a:prstGeom prst="flowChartConnector">
-            <a:avLst/>
-          </a:prstGeom>
-          <a:solidFill>
-            <a:schemeClr val="accent1">
-              <a:lumMod val="60000"/>
-              <a:lumOff val="40000"/>
-            </a:schemeClr>
-          </a:solidFill>
-          <a:ln>
-            <a:solidFill>
-              <a:schemeClr val="bg1">
-                <a:lumMod val="95000"/>
-              </a:schemeClr>
-            </a:solidFill>
-          </a:ln>
-        </p:spPr>
-        <p:style>
-          <a:lnRef idx="2">
-            <a:schemeClr val="accent1">
-              <a:shade val="50000"/>
-            </a:schemeClr>
-          </a:lnRef>
-          <a:fillRef idx="1">
-            <a:schemeClr val="accent1"/>
-          </a:fillRef>
-          <a:effectRef idx="0">
-            <a:schemeClr val="accent1"/>
-          </a:effectRef>
-          <a:fontRef idx="minor">
-            <a:schemeClr val="lt1"/>
-          </a:fontRef>
-        </p:style>
-        <p:txBody>
-          <a:bodyPr rtlCol="0" anchor="ctr"/>
-          <a:lstStyle/>
-          <a:p>
-            <a:pPr algn="ctr"/>
-            <a:endParaRPr lang="en-SG"/>
-          </a:p>
-        </p:txBody>
-      </p:sp>
-      <p:sp>
-        <p:nvSpPr>
-          <p:cNvPr id="17" name="8"/>
-          <p:cNvSpPr>
-            <a:spLocks noChangeAspect="1"/>
-          </p:cNvSpPr>
-          <p:nvPr/>
-        </p:nvSpPr>
-        <p:spPr>
-          <a:xfrm rot="25063704">
-            <a:off x="8289551" y="6134717"/>
-            <a:ext cx="619200" cy="617423"/>
-          </a:xfrm>
-          <a:prstGeom prst="flowChartConnector">
-            <a:avLst/>
-          </a:prstGeom>
-          <a:solidFill>
-            <a:schemeClr val="accent1">
-              <a:lumMod val="60000"/>
-              <a:lumOff val="40000"/>
-            </a:schemeClr>
-          </a:solidFill>
-          <a:ln>
-            <a:solidFill>
-              <a:schemeClr val="bg1">
-                <a:lumMod val="95000"/>
-              </a:schemeClr>
-            </a:solidFill>
-          </a:ln>
-        </p:spPr>
-        <p:style>
-          <a:lnRef idx="2">
-            <a:schemeClr val="accent1">
-              <a:shade val="50000"/>
-            </a:schemeClr>
-          </a:lnRef>
-          <a:fillRef idx="1">
-            <a:schemeClr val="accent1"/>
-          </a:fillRef>
-          <a:effectRef idx="0">
-            <a:schemeClr val="accent1"/>
-          </a:effectRef>
-          <a:fontRef idx="minor">
-            <a:schemeClr val="lt1"/>
-          </a:fontRef>
-        </p:style>
-        <p:txBody>
-          <a:bodyPr rtlCol="0" anchor="ctr"/>
-          <a:lstStyle/>
-          <a:p>
-            <a:pPr algn="ctr"/>
-            <a:endParaRPr lang="en-SG"/>
-          </a:p>
-        </p:txBody>
-      </p:sp>
-      <p:sp>
-        <p:nvSpPr>
-          <p:cNvPr id="19" name="TextBox 5"/>
-          <p:cNvSpPr txBox="1"/>
-          <p:nvPr/>
-        </p:nvSpPr>
-        <p:spPr>
-          <a:xfrm>
-            <a:off x="1763688" y="2780928"/>
-            <a:ext cx="7488832" cy="1107996"/>
-          </a:xfrm>
-          <a:prstGeom prst="rect">
-            <a:avLst/>
-          </a:prstGeom>
-          <a:noFill/>
-        </p:spPr>
-        <p:txBody>
-          <a:bodyPr wrap="square" rtlCol="0">
-            <a:spAutoFit/>
-          </a:bodyPr>
-          <a:lstStyle/>
-          <a:p>
-            <a:r>
-              <a:rPr lang="en-US" sz="6600" b="1" dirty="0" smtClean="0">
-                <a:solidFill>
-                  <a:schemeClr val="bg1"/>
-                </a:solidFill>
-              </a:rPr>
-              <a:t>…</a:t>
-            </a:r>
-            <a:r>
-              <a:rPr lang="en-US" sz="6600" b="1" dirty="0" smtClean="0">
-                <a:solidFill>
-                  <a:schemeClr val="tx2">
-                    <a:lumMod val="60000"/>
-                    <a:lumOff val="40000"/>
-                  </a:schemeClr>
-                </a:solidFill>
-              </a:rPr>
-              <a:t> and more</a:t>
-            </a:r>
-            <a:endParaRPr lang="en-SG" sz="6600" b="1" dirty="0">
-              <a:solidFill>
-                <a:schemeClr val="tx2">
-                  <a:lumMod val="60000"/>
-                  <a:lumOff val="40000"/>
-                </a:schemeClr>
-              </a:solidFill>
-            </a:endParaRPr>
-          </a:p>
-        </p:txBody>
-      </p:sp>
     </p:spTree>
     <p:extLst>
       <p:ext uri="{BB962C8B-B14F-4D97-AF65-F5344CB8AC3E}">
-        <p14:creationId xmlns:p14="http://schemas.microsoft.com/office/powerpoint/2010/main" val="3663851411"/>
+        <p14:creationId xmlns:p14="http://schemas.microsoft.com/office/powerpoint/2010/main" val="2407679512"/>
       </p:ext>
     </p:extLst>
   </p:cSld>
@@ -4339,19 +3779,12 @@
   </p:clrMapOvr>
   <mc:AlternateContent xmlns:mc="http://schemas.openxmlformats.org/markup-compatibility/2006">
     <mc:Choice xmlns:p14="http://schemas.microsoft.com/office/powerpoint/2010/main" Requires="p14">
-      <p:transition p14:dur="10" advTm="1000"/>
+      <p:transition p14:dur="10" advTm="2000"/>
     </mc:Choice>
     <mc:Fallback>
-      <p:transition advTm="1000"/>
+      <p:transition advTm="2000"/>
     </mc:Fallback>
   </mc:AlternateContent>
-  <p:timing>
-    <p:tnLst>
-      <p:par>
-        <p:cTn id="1" dur="indefinite" restart="never" nodeType="tmRoot"/>
-      </p:par>
-    </p:tnLst>
-  </p:timing>
 </p:sld>
 </file>
 
@@ -4395,17 +3828,6 @@
           <a:lstStyle/>
           <a:p>
             <a:r>
-              <a:rPr lang="en-US" sz="6600" b="1" dirty="0" smtClean="0">
-                <a:solidFill>
-                  <a:schemeClr val="tx2">
-                    <a:lumMod val="60000"/>
-                    <a:lumOff val="40000"/>
-                  </a:schemeClr>
-                </a:solidFill>
-              </a:rPr>
-              <a:t>Adjoin verticall</a:t>
-            </a:r>
-            <a:r>
               <a:rPr lang="en-US" sz="6600" b="1" dirty="0">
                 <a:solidFill>
                   <a:schemeClr val="tx2">
@@ -4414,7 +3836,7 @@
                   </a:schemeClr>
                 </a:solidFill>
               </a:rPr>
-              <a:t>y</a:t>
+              <a:t>Adjoin vertically</a:t>
             </a:r>
             <a:endParaRPr lang="en-SG" sz="6600" b="1" dirty="0">
               <a:solidFill>
@@ -4658,13 +4080,6 @@
       </p:transition>
     </mc:Fallback>
   </mc:AlternateContent>
-  <p:timing>
-    <p:tnLst>
-      <p:par>
-        <p:cTn id="1" dur="indefinite" restart="never" nodeType="tmRoot"/>
-      </p:par>
-    </p:tnLst>
-  </p:timing>
 </p:sld>
 </file>
 
@@ -4708,7 +4123,7 @@
           <a:lstStyle/>
           <a:p>
             <a:r>
-              <a:rPr lang="en-US" sz="6600" b="1" dirty="0" smtClean="0">
+              <a:rPr lang="en-US" sz="6600" b="1" dirty="0">
                 <a:solidFill>
                   <a:schemeClr val="tx2">
                     <a:lumMod val="60000"/>
@@ -5265,7 +4680,7 @@
           <a:lstStyle/>
           <a:p>
             <a:r>
-              <a:rPr lang="en-US" sz="6600" b="1" dirty="0" smtClean="0">
+              <a:rPr lang="en-US" sz="6600" b="1" dirty="0">
                 <a:solidFill>
                   <a:schemeClr val="tx2">
                     <a:lumMod val="60000"/>
@@ -5580,13 +4995,6 @@
       <p:transition advTm="0"/>
     </mc:Fallback>
   </mc:AlternateContent>
-  <p:timing>
-    <p:tnLst>
-      <p:par>
-        <p:cTn id="1" dur="indefinite" restart="never" nodeType="tmRoot"/>
-      </p:par>
-    </p:tnLst>
-  </p:timing>
 </p:sld>
 </file>
 
@@ -5630,7 +5038,7 @@
           <a:lstStyle/>
           <a:p>
             <a:r>
-              <a:rPr lang="en-US" sz="6600" b="1" dirty="0" smtClean="0">
+              <a:rPr lang="en-US" sz="6600" b="1" dirty="0">
                 <a:solidFill>
                   <a:schemeClr val="tx2">
                     <a:lumMod val="60000"/>
@@ -5945,13 +5353,6 @@
       <p:transition advTm="0"/>
     </mc:Fallback>
   </mc:AlternateContent>
-  <p:timing>
-    <p:tnLst>
-      <p:par>
-        <p:cTn id="1" dur="indefinite" restart="never" nodeType="tmRoot"/>
-      </p:par>
-    </p:tnLst>
-  </p:timing>
 </p:sld>
 </file>
 
@@ -5995,7 +5396,7 @@
           <a:lstStyle/>
           <a:p>
             <a:r>
-              <a:rPr lang="en-US" sz="6600" b="1" dirty="0" smtClean="0">
+              <a:rPr lang="en-US" sz="6600" b="1" dirty="0">
                 <a:solidFill>
                   <a:schemeClr val="tx2">
                     <a:lumMod val="60000"/>
@@ -6310,13 +5711,6 @@
       <p:transition advTm="0"/>
     </mc:Fallback>
   </mc:AlternateContent>
-  <p:timing>
-    <p:tnLst>
-      <p:par>
-        <p:cTn id="1" dur="indefinite" restart="never" nodeType="tmRoot"/>
-      </p:par>
-    </p:tnLst>
-  </p:timing>
 </p:sld>
 </file>
 
@@ -6360,7 +5754,7 @@
           <a:lstStyle/>
           <a:p>
             <a:r>
-              <a:rPr lang="en-US" sz="6600" b="1" dirty="0" smtClean="0">
+              <a:rPr lang="en-US" sz="6600" b="1" dirty="0">
                 <a:solidFill>
                   <a:schemeClr val="tx2">
                     <a:lumMod val="60000"/>
@@ -6675,13 +6069,6 @@
       <p:transition advTm="0"/>
     </mc:Fallback>
   </mc:AlternateContent>
-  <p:timing>
-    <p:tnLst>
-      <p:par>
-        <p:cTn id="1" dur="indefinite" restart="never" nodeType="tmRoot"/>
-      </p:par>
-    </p:tnLst>
-  </p:timing>
 </p:sld>
 </file>
 
@@ -6725,7 +6112,7 @@
           <a:lstStyle/>
           <a:p>
             <a:r>
-              <a:rPr lang="en-US" sz="6600" b="1" dirty="0" smtClean="0">
+              <a:rPr lang="en-US" sz="6600" b="1" dirty="0">
                 <a:solidFill>
                   <a:schemeClr val="tx2">
                     <a:lumMod val="60000"/>
@@ -7040,13 +6427,6 @@
       <p:transition advTm="1000"/>
     </mc:Fallback>
   </mc:AlternateContent>
-  <p:timing>
-    <p:tnLst>
-      <p:par>
-        <p:cTn id="1" dur="indefinite" restart="never" nodeType="tmRoot"/>
-      </p:par>
-    </p:tnLst>
-  </p:timing>
 </p:sld>
 </file>
 
@@ -7090,7 +6470,7 @@
           <a:lstStyle/>
           <a:p>
             <a:r>
-              <a:rPr lang="en-US" sz="6600" b="1" dirty="0" smtClean="0">
+              <a:rPr lang="en-US" sz="6600" b="1" dirty="0">
                 <a:solidFill>
                   <a:schemeClr val="tx2">
                     <a:lumMod val="60000"/>
@@ -7682,7 +7062,7 @@
           <a:lstStyle/>
           <a:p>
             <a:r>
-              <a:rPr lang="en-US" sz="6600" b="1" dirty="0" smtClean="0">
+              <a:rPr lang="en-US" sz="6600" b="1" dirty="0">
                 <a:solidFill>
                   <a:schemeClr val="tx2">
                     <a:lumMod val="60000"/>
@@ -7989,13 +7369,6 @@
       </p:transition>
     </mc:Fallback>
   </mc:AlternateContent>
-  <p:timing>
-    <p:tnLst>
-      <p:par>
-        <p:cTn id="1" dur="indefinite" restart="never" nodeType="tmRoot"/>
-      </p:par>
-    </p:tnLst>
-  </p:timing>
 </p:sld>
 </file>
 
@@ -8039,7 +7412,7 @@
           <a:lstStyle/>
           <a:p>
             <a:r>
-              <a:rPr lang="en-US" sz="6600" b="1" dirty="0" smtClean="0">
+              <a:rPr lang="en-US" sz="6600" b="1" dirty="0">
                 <a:solidFill>
                   <a:schemeClr val="tx2">
                     <a:lumMod val="60000"/>
@@ -8346,13 +7719,6 @@
       </p:transition>
     </mc:Fallback>
   </mc:AlternateContent>
-  <p:timing>
-    <p:tnLst>
-      <p:par>
-        <p:cTn id="1" dur="indefinite" restart="never" nodeType="tmRoot"/>
-      </p:par>
-    </p:tnLst>
-  </p:timing>
 </p:sld>
 </file>
 
@@ -8396,7 +7762,7 @@
           <a:lstStyle/>
           <a:p>
             <a:r>
-              <a:rPr lang="en-US" sz="6600" b="1" dirty="0" smtClean="0">
+              <a:rPr lang="en-US" sz="6600" b="1" dirty="0">
                 <a:solidFill>
                   <a:schemeClr val="tx2">
                     <a:lumMod val="60000"/>
@@ -8669,16 +8035,12 @@
   <p:clrMapOvr>
     <a:masterClrMapping/>
   </p:clrMapOvr>
-  <mc:AlternateContent xmlns:mc="http://schemas.openxmlformats.org/markup-compatibility/2006" xmlns:p14="http://schemas.microsoft.com/office/powerpoint/2010/main">
-    <mc:Choice Requires="p14">
-      <p:transition spd="med" p14:dur="700" advTm="2000">
-        <p:fade/>
-      </p:transition>
+  <mc:AlternateContent xmlns:mc="http://schemas.openxmlformats.org/markup-compatibility/2006">
+    <mc:Choice xmlns:p14="http://schemas.microsoft.com/office/powerpoint/2010/main" Requires="p14">
+      <p:transition p14:dur="10" advTm="2000"/>
     </mc:Choice>
-    <mc:Fallback xmlns="">
-      <p:transition spd="med" advTm="2000">
-        <p:fade/>
-      </p:transition>
+    <mc:Fallback>
+      <p:transition advTm="2000"/>
     </mc:Fallback>
   </mc:AlternateContent>
   <p:timing>
@@ -9019,7 +8381,7 @@
           <a:lstStyle/>
           <a:p>
             <a:r>
-              <a:rPr lang="en-US" sz="6600" b="1" dirty="0" smtClean="0">
+              <a:rPr lang="en-US" sz="6600" b="1" dirty="0">
                 <a:solidFill>
                   <a:schemeClr val="tx2">
                     <a:lumMod val="60000"/>
@@ -10033,7 +9395,7 @@
           <a:lstStyle/>
           <a:p>
             <a:r>
-              <a:rPr lang="en-US" sz="6600" b="1" dirty="0" smtClean="0">
+              <a:rPr lang="en-US" sz="6600" b="1" dirty="0">
                 <a:solidFill>
                   <a:schemeClr val="tx2">
                     <a:lumMod val="60000"/>
@@ -10064,13 +9426,13 @@
   <p:clrMapOvr>
     <a:masterClrMapping/>
   </p:clrMapOvr>
-  <mc:AlternateContent xmlns:mc="http://schemas.openxmlformats.org/markup-compatibility/2006">
-    <mc:Choice xmlns:p14="http://schemas.microsoft.com/office/powerpoint/2010/main" Requires="p14">
+  <mc:AlternateContent xmlns:mc="http://schemas.openxmlformats.org/markup-compatibility/2006" xmlns:p14="http://schemas.microsoft.com/office/powerpoint/2010/main">
+    <mc:Choice Requires="p14">
       <p:transition spd="med" p14:dur="700" advTm="1000">
         <p:fade/>
       </p:transition>
     </mc:Choice>
-    <mc:Fallback>
+    <mc:Fallback xmlns="">
       <p:transition spd="med" advTm="1000">
         <p:fade/>
       </p:transition>
@@ -11260,7 +10622,7 @@
           <a:lstStyle/>
           <a:p>
             <a:r>
-              <a:rPr lang="en-US" sz="6600" b="1" dirty="0" smtClean="0">
+              <a:rPr lang="en-US" sz="6600" b="1" dirty="0">
                 <a:solidFill>
                   <a:schemeClr val="tx2">
                     <a:lumMod val="60000"/>
@@ -12335,7 +11697,7 @@
           <a:lstStyle/>
           <a:p>
             <a:r>
-              <a:rPr lang="en-US" sz="6600" b="1" dirty="0" smtClean="0">
+              <a:rPr lang="en-US" sz="6600" b="1" dirty="0">
                 <a:solidFill>
                   <a:schemeClr val="tx2">
                     <a:lumMod val="60000"/>
@@ -12366,25 +11728,18 @@
   <p:clrMapOvr>
     <a:masterClrMapping/>
   </p:clrMapOvr>
-  <mc:AlternateContent xmlns:mc="http://schemas.openxmlformats.org/markup-compatibility/2006">
-    <mc:Choice xmlns:p14="http://schemas.microsoft.com/office/powerpoint/2010/main" Requires="p14">
+  <mc:AlternateContent xmlns:mc="http://schemas.openxmlformats.org/markup-compatibility/2006" xmlns:p14="http://schemas.microsoft.com/office/powerpoint/2010/main">
+    <mc:Choice Requires="p14">
       <p:transition spd="med" p14:dur="700" advTm="0">
         <p:fade/>
       </p:transition>
     </mc:Choice>
-    <mc:Fallback>
+    <mc:Fallback xmlns="">
       <p:transition spd="med" advTm="0">
         <p:fade/>
       </p:transition>
     </mc:Fallback>
   </mc:AlternateContent>
-  <p:timing>
-    <p:tnLst>
-      <p:par>
-        <p:cTn id="1" dur="indefinite" restart="never" nodeType="tmRoot"/>
-      </p:par>
-    </p:tnLst>
-  </p:timing>
 </p:sld>
 </file>
 
@@ -12916,13 +12271,6 @@
       </p:transition>
     </mc:Fallback>
   </mc:AlternateContent>
-  <p:timing>
-    <p:tnLst>
-      <p:par>
-        <p:cTn id="1" dur="indefinite" restart="never" nodeType="tmRoot"/>
-      </p:par>
-    </p:tnLst>
-  </p:timing>
 </p:sld>
 </file>
 
@@ -14332,7 +13680,7 @@
           <a:lstStyle/>
           <a:p>
             <a:r>
-              <a:rPr lang="en-US" sz="6600" b="1" dirty="0" smtClean="0">
+              <a:rPr lang="en-US" sz="6600" b="1" dirty="0">
                 <a:solidFill>
                   <a:schemeClr val="bg1"/>
                 </a:solidFill>
@@ -14340,7 +13688,7 @@
               <a:t>…</a:t>
             </a:r>
             <a:r>
-              <a:rPr lang="en-US" sz="6600" b="1" dirty="0" smtClean="0">
+              <a:rPr lang="en-US" sz="6600" b="1" dirty="0">
                 <a:solidFill>
                   <a:schemeClr val="tx2">
                     <a:lumMod val="60000"/>
@@ -14383,13 +13731,6 @@
       </p:transition>
     </mc:Fallback>
   </mc:AlternateContent>
-  <p:timing>
-    <p:tnLst>
-      <p:par>
-        <p:cTn id="1" dur="indefinite" restart="never" nodeType="tmRoot"/>
-      </p:par>
-    </p:tnLst>
-  </p:timing>
 </p:sld>
 </file>
 
@@ -14458,13 +13799,6 @@
       <p:transition spd="slow" advTm="2000"/>
     </mc:Fallback>
   </mc:AlternateContent>
-  <p:timing>
-    <p:tnLst>
-      <p:par>
-        <p:cTn id="1" dur="indefinite" restart="never" nodeType="tmRoot"/>
-      </p:par>
-    </p:tnLst>
-  </p:timing>
 </p:sld>
 </file>
 
@@ -14508,7 +13842,7 @@
           <a:lstStyle/>
           <a:p>
             <a:r>
-              <a:rPr lang="en-US" sz="6600" b="1" dirty="0" smtClean="0">
+              <a:rPr lang="en-US" sz="6600" b="1" dirty="0">
                 <a:solidFill>
                   <a:schemeClr val="tx2">
                     <a:lumMod val="60000"/>
@@ -15035,7 +14369,7 @@
           <a:lstStyle/>
           <a:p>
             <a:r>
-              <a:rPr lang="en-US" sz="6600" b="1" dirty="0" smtClean="0">
+              <a:rPr lang="en-US" sz="6600" b="1" dirty="0">
                 <a:solidFill>
                   <a:schemeClr val="tx2">
                     <a:lumMod val="60000"/>
@@ -15449,7 +14783,7 @@
           <a:lstStyle/>
           <a:p>
             <a:r>
-              <a:rPr lang="en-US" sz="6600" b="1" dirty="0" smtClean="0">
+              <a:rPr lang="en-US" sz="6600" b="1" dirty="0">
                 <a:solidFill>
                   <a:schemeClr val="tx2">
                     <a:lumMod val="60000"/>
@@ -16063,7 +15397,7 @@
           <a:lstStyle/>
           <a:p>
             <a:r>
-              <a:rPr lang="en-US" sz="6600" b="1" dirty="0" smtClean="0">
+              <a:rPr lang="en-US" sz="6600" b="1" dirty="0">
                 <a:solidFill>
                   <a:schemeClr val="tx2">
                     <a:lumMod val="60000"/>
@@ -16366,11 +15700,11 @@
   <p:clrMapOvr>
     <a:masterClrMapping/>
   </p:clrMapOvr>
-  <mc:AlternateContent xmlns:mc="http://schemas.openxmlformats.org/markup-compatibility/2006">
-    <mc:Choice xmlns:p14="http://schemas.microsoft.com/office/powerpoint/2010/main" Requires="p14">
+  <mc:AlternateContent xmlns:mc="http://schemas.openxmlformats.org/markup-compatibility/2006" xmlns:p14="http://schemas.microsoft.com/office/powerpoint/2010/main">
+    <mc:Choice Requires="p14">
       <p:transition spd="med" p14:dur="700" advClick="0" advTm="0"/>
     </mc:Choice>
-    <mc:Fallback>
+    <mc:Fallback xmlns="">
       <p:transition spd="med" advClick="0" advTm="0"/>
     </mc:Fallback>
   </mc:AlternateContent>
@@ -16590,7 +15924,7 @@
           <a:lstStyle/>
           <a:p>
             <a:r>
-              <a:rPr lang="en-US" sz="6600" b="1" dirty="0" smtClean="0">
+              <a:rPr lang="en-US" sz="6600" b="1" dirty="0">
                 <a:solidFill>
                   <a:schemeClr val="tx2">
                     <a:lumMod val="60000"/>

</xml_diff>